<commit_message>
Update html api reference
</commit_message>
<xml_diff>
--- a/Angular/AngularPart2.pptx
+++ b/Angular/AngularPart2.pptx
@@ -232,7 +232,7 @@
           <a:p>
             <a:fld id="{B1D8D8C1-C93D-42CA-9A97-FF499558D459}" type="datetimeFigureOut">
               <a:rPr lang="en-US" smtClean="0"/>
-              <a:t>12/5/2023</a:t>
+              <a:t>12/6/2023</a:t>
             </a:fld>
             <a:endParaRPr lang="en-US" dirty="0"/>
           </a:p>
@@ -409,7 +409,7 @@
           <a:p>
             <a:fld id="{80846F56-1468-4900-AFBA-9E5EE306BC08}" type="datetimeFigureOut">
               <a:rPr lang="en-US" smtClean="0"/>
-              <a:t>12/5/2023</a:t>
+              <a:t>12/6/2023</a:t>
             </a:fld>
             <a:endParaRPr lang="en-US" dirty="0"/>
           </a:p>
@@ -1403,7 +1403,7 @@
             <a:fld id="{B61BEF0D-F0BB-DE4B-95CE-6DB70DBA9567}" type="datetimeFigureOut">
               <a:rPr lang="en-US" smtClean="0"/>
               <a:pPr/>
-              <a:t>12/5/2023</a:t>
+              <a:t>12/6/2023</a:t>
             </a:fld>
             <a:endParaRPr lang="en-US" dirty="0"/>
           </a:p>
@@ -1744,7 +1744,7 @@
             <a:fld id="{B61BEF0D-F0BB-DE4B-95CE-6DB70DBA9567}" type="datetimeFigureOut">
               <a:rPr lang="en-US" smtClean="0"/>
               <a:pPr/>
-              <a:t>12/5/2023</a:t>
+              <a:t>12/6/2023</a:t>
             </a:fld>
             <a:endParaRPr lang="en-US" dirty="0"/>
           </a:p>
@@ -2148,7 +2148,7 @@
             <a:fld id="{B61BEF0D-F0BB-DE4B-95CE-6DB70DBA9567}" type="datetimeFigureOut">
               <a:rPr lang="en-US" smtClean="0"/>
               <a:pPr/>
-              <a:t>12/5/2023</a:t>
+              <a:t>12/6/2023</a:t>
             </a:fld>
             <a:endParaRPr lang="en-US" dirty="0"/>
           </a:p>
@@ -2487,7 +2487,7 @@
             <a:fld id="{B61BEF0D-F0BB-DE4B-95CE-6DB70DBA9567}" type="datetimeFigureOut">
               <a:rPr lang="en-US" smtClean="0"/>
               <a:pPr/>
-              <a:t>12/5/2023</a:t>
+              <a:t>12/6/2023</a:t>
             </a:fld>
             <a:endParaRPr lang="en-US" dirty="0"/>
           </a:p>
@@ -2810,7 +2810,7 @@
             <a:fld id="{B61BEF0D-F0BB-DE4B-95CE-6DB70DBA9567}" type="datetimeFigureOut">
               <a:rPr lang="en-US" smtClean="0"/>
               <a:pPr/>
-              <a:t>12/5/2023</a:t>
+              <a:t>12/6/2023</a:t>
             </a:fld>
             <a:endParaRPr lang="en-US" dirty="0"/>
           </a:p>
@@ -3209,7 +3209,7 @@
             <a:fld id="{B61BEF0D-F0BB-DE4B-95CE-6DB70DBA9567}" type="datetimeFigureOut">
               <a:rPr lang="en-US" smtClean="0"/>
               <a:pPr/>
-              <a:t>12/5/2023</a:t>
+              <a:t>12/6/2023</a:t>
             </a:fld>
             <a:endParaRPr lang="en-US" dirty="0"/>
           </a:p>
@@ -3469,7 +3469,7 @@
             <a:fld id="{B61BEF0D-F0BB-DE4B-95CE-6DB70DBA9567}" type="datetimeFigureOut">
               <a:rPr lang="en-US" smtClean="0"/>
               <a:pPr/>
-              <a:t>12/5/2023</a:t>
+              <a:t>12/6/2023</a:t>
             </a:fld>
             <a:endParaRPr lang="en-US" dirty="0"/>
           </a:p>
@@ -3734,7 +3734,7 @@
             <a:fld id="{B61BEF0D-F0BB-DE4B-95CE-6DB70DBA9567}" type="datetimeFigureOut">
               <a:rPr lang="en-US" smtClean="0"/>
               <a:pPr/>
-              <a:t>12/5/2023</a:t>
+              <a:t>12/6/2023</a:t>
             </a:fld>
             <a:endParaRPr lang="en-US" dirty="0"/>
           </a:p>
@@ -8619,7 +8619,7 @@
           <a:p>
             <a:fld id="{52647F38-B617-4D2F-AE0A-013F0C4D2C57}" type="datetimeFigureOut">
               <a:rPr lang="en-US" smtClean="0"/>
-              <a:t>12/5/2023</a:t>
+              <a:t>12/6/2023</a:t>
             </a:fld>
             <a:endParaRPr lang="en-US" dirty="0"/>
           </a:p>
@@ -10864,7 +10864,7 @@
             <a:fld id="{B61BEF0D-F0BB-DE4B-95CE-6DB70DBA9567}" type="datetimeFigureOut">
               <a:rPr lang="en-US" smtClean="0"/>
               <a:pPr/>
-              <a:t>12/5/2023</a:t>
+              <a:t>12/6/2023</a:t>
             </a:fld>
             <a:endParaRPr lang="en-US" dirty="0"/>
           </a:p>
@@ -11189,7 +11189,7 @@
           <a:p>
             <a:fld id="{05BFA754-D5C3-4E66-96A6-867B257F58DC}" type="datetimeFigureOut">
               <a:rPr lang="en-US" smtClean="0"/>
-              <a:t>12/5/2023</a:t>
+              <a:t>12/6/2023</a:t>
             </a:fld>
             <a:endParaRPr lang="en-US" dirty="0"/>
           </a:p>
@@ -11648,7 +11648,7 @@
             <a:fld id="{B61BEF0D-F0BB-DE4B-95CE-6DB70DBA9567}" type="datetimeFigureOut">
               <a:rPr lang="en-US" smtClean="0"/>
               <a:pPr/>
-              <a:t>12/5/2023</a:t>
+              <a:t>12/6/2023</a:t>
             </a:fld>
             <a:endParaRPr lang="en-US" dirty="0"/>
           </a:p>
@@ -11856,7 +11856,7 @@
             <a:fld id="{B61BEF0D-F0BB-DE4B-95CE-6DB70DBA9567}" type="datetimeFigureOut">
               <a:rPr lang="en-US" smtClean="0"/>
               <a:pPr/>
-              <a:t>12/5/2023</a:t>
+              <a:t>12/6/2023</a:t>
             </a:fld>
             <a:endParaRPr lang="en-US" dirty="0"/>
           </a:p>
@@ -12036,7 +12036,7 @@
             <a:fld id="{B61BEF0D-F0BB-DE4B-95CE-6DB70DBA9567}" type="datetimeFigureOut">
               <a:rPr lang="en-US" smtClean="0"/>
               <a:pPr/>
-              <a:t>12/5/2023</a:t>
+              <a:t>12/6/2023</a:t>
             </a:fld>
             <a:endParaRPr lang="en-US" dirty="0"/>
           </a:p>
@@ -12372,7 +12372,7 @@
             <a:fld id="{B61BEF0D-F0BB-DE4B-95CE-6DB70DBA9567}" type="datetimeFigureOut">
               <a:rPr lang="en-US" smtClean="0"/>
               <a:pPr/>
-              <a:t>12/5/2023</a:t>
+              <a:t>12/6/2023</a:t>
             </a:fld>
             <a:endParaRPr lang="en-US" dirty="0"/>
           </a:p>
@@ -12720,7 +12720,7 @@
             <a:fld id="{B61BEF0D-F0BB-DE4B-95CE-6DB70DBA9567}" type="datetimeFigureOut">
               <a:rPr lang="en-US" smtClean="0"/>
               <a:pPr/>
-              <a:t>12/5/2023</a:t>
+              <a:t>12/6/2023</a:t>
             </a:fld>
             <a:endParaRPr lang="en-US" dirty="0"/>
           </a:p>
@@ -14840,7 +14840,7 @@
             <a:fld id="{B61BEF0D-F0BB-DE4B-95CE-6DB70DBA9567}" type="datetimeFigureOut">
               <a:rPr lang="en-US" smtClean="0"/>
               <a:pPr/>
-              <a:t>12/5/2023</a:t>
+              <a:t>12/6/2023</a:t>
             </a:fld>
             <a:endParaRPr lang="en-US" dirty="0"/>
           </a:p>
@@ -15642,28 +15642,26 @@
             <a:endParaRPr lang="en-US" sz="2400" dirty="0"/>
           </a:p>
           <a:p>
-            <a:pPr marL="342900" indent="-342900">
-              <a:buFont typeface="Wingdings" panose="05000000000000000000" pitchFamily="2" charset="2"/>
-              <a:buChar char="q"/>
-            </a:pPr>
             <a:r>
               <a:rPr lang="en-US" sz="2400" dirty="0"/>
-              <a:t>Button methods can be found @ </a:t>
-            </a:r>
+              <a:t>Element methods can be found @ </a:t>
+            </a:r>
+          </a:p>
+          <a:p>
             <a:r>
               <a:rPr lang="en-US" sz="2400" dirty="0">
                 <a:hlinkClick r:id="rId2"/>
               </a:rPr>
-              <a:t>https://www.w3schools.com/jsref/dom_obj_event.asp</a:t>
-            </a:r>
-            <a:br>
-              <a:rPr lang="en-US" sz="2400" dirty="0"/>
-            </a:br>
+              <a:t>https://developer.mozilla.org/en-US/docs/Web/HTML/Element</a:t>
+            </a:r>
+            <a:endParaRPr lang="en-US" sz="2400" dirty="0"/>
+          </a:p>
+          <a:p>
             <a:r>
               <a:rPr lang="en-US" sz="2400" dirty="0">
                 <a:hlinkClick r:id="rId3"/>
               </a:rPr>
-              <a:t>https://developer.mozilla.org/en-US/docs/Web/API/HTMLButtonElement</a:t>
+              <a:t>https://www.w3schools.com/jsref/</a:t>
             </a:r>
             <a:endParaRPr lang="en-US" sz="2400" dirty="0"/>
           </a:p>
@@ -21155,12 +21153,16 @@
               <a:t>From Visual Studio, use </a:t>
             </a:r>
             <a:r>
-              <a:rPr lang="en-US" dirty="0" err="1"/>
+              <a:rPr lang="en-US" b="1" u="sng" dirty="0" err="1"/>
               <a:t>npm</a:t>
             </a:r>
             <a:r>
+              <a:rPr lang="en-US" b="1" u="sng" dirty="0"/>
+              <a:t> to install bootstrap as production </a:t>
+            </a:r>
+            <a:r>
               <a:rPr lang="en-US" dirty="0"/>
-              <a:t> to install bootstrap as production or</a:t>
+              <a:t>or</a:t>
             </a:r>
           </a:p>
           <a:p>
@@ -21173,27 +21175,27 @@
               <a:t>From command line within the project folder use: </a:t>
             </a:r>
             <a:r>
-              <a:rPr lang="en-US" dirty="0" err="1"/>
+              <a:rPr lang="en-US" b="1" u="sng" dirty="0" err="1"/>
               <a:t>npm</a:t>
             </a:r>
             <a:r>
-              <a:rPr lang="en-US" dirty="0"/>
+              <a:rPr lang="en-US" b="1" u="sng" dirty="0"/>
               <a:t> </a:t>
             </a:r>
             <a:r>
-              <a:rPr lang="en-US" dirty="0" err="1"/>
+              <a:rPr lang="en-US" b="1" u="sng" dirty="0" err="1"/>
               <a:t>i</a:t>
             </a:r>
             <a:r>
-              <a:rPr lang="en-US" dirty="0"/>
+              <a:rPr lang="en-US" b="1" u="sng" dirty="0"/>
               <a:t> </a:t>
             </a:r>
             <a:r>
-              <a:rPr lang="en-US" dirty="0" err="1"/>
+              <a:rPr lang="en-US" b="1" u="sng" dirty="0" err="1"/>
               <a:t>boostrap</a:t>
             </a:r>
             <a:r>
-              <a:rPr lang="en-US" dirty="0"/>
+              <a:rPr lang="en-US" b="1" u="sng" dirty="0"/>
               <a:t> --save</a:t>
             </a:r>
           </a:p>
@@ -21210,10 +21212,10 @@
               <a:t>Place the below in the </a:t>
             </a:r>
             <a:r>
-              <a:rPr lang="en-US" dirty="0" err="1"/>
+              <a:rPr lang="en-US" b="1" u="sng" dirty="0" err="1"/>
               <a:t>angular.json</a:t>
             </a:r>
-            <a:endParaRPr lang="en-US" dirty="0"/>
+            <a:endParaRPr lang="en-US" b="1" u="sng" dirty="0"/>
           </a:p>
           <a:p>
             <a:r>
@@ -24026,7 +24028,7 @@
         <p:spPr>
           <a:xfrm>
             <a:off x="265243" y="1255486"/>
-            <a:ext cx="11661509" cy="4154984"/>
+            <a:ext cx="11661509" cy="3416320"/>
           </a:xfrm>
           <a:prstGeom prst="rect">
             <a:avLst/>
@@ -24115,29 +24117,25 @@
             </a:pPr>
             <a:r>
               <a:rPr lang="en-US" sz="2400" dirty="0"/>
-              <a:t>Button properties can be found @ </a:t>
-            </a:r>
+              <a:t>Element properties can be found @</a:t>
+            </a:r>
+          </a:p>
+          <a:p>
             <a:r>
               <a:rPr lang="en-US" sz="2400" dirty="0">
                 <a:hlinkClick r:id="rId2"/>
               </a:rPr>
-              <a:t>https://www.w3schools.com/jsref/dom_obj_pushbutton.asp</a:t>
-            </a:r>
-            <a:br>
-              <a:rPr lang="en-US" sz="2400" dirty="0"/>
-            </a:br>
+              <a:t>https://developer.mozilla.org/en-US/docs/Web/HTML/Element</a:t>
+            </a:r>
+            <a:endParaRPr lang="en-US" sz="2400" dirty="0"/>
+          </a:p>
+          <a:p>
             <a:r>
               <a:rPr lang="en-US" sz="2400" dirty="0">
                 <a:hlinkClick r:id="rId3"/>
               </a:rPr>
-              <a:t>https://developer.mozilla.org/en-US/docs/Web/API/HTMLButtonElement</a:t>
-            </a:r>
-            <a:endParaRPr lang="en-US" sz="2400" dirty="0"/>
-          </a:p>
-          <a:p>
-            <a:endParaRPr lang="en-US" sz="2400" dirty="0"/>
-          </a:p>
-          <a:p>
+              <a:t>https://www.w3schools.com/jsref/</a:t>
+            </a:r>
             <a:endParaRPr lang="en-US" sz="2400" dirty="0"/>
           </a:p>
           <a:p>
@@ -24715,7 +24713,7 @@
         <p:spPr>
           <a:xfrm>
             <a:off x="493486" y="1560286"/>
-            <a:ext cx="11436788" cy="2677656"/>
+            <a:ext cx="11436788" cy="2308324"/>
           </a:xfrm>
           <a:prstGeom prst="rect">
             <a:avLst/>
@@ -24764,26 +24762,25 @@
             </a:pPr>
             <a:r>
               <a:rPr lang="en-US" sz="2400" dirty="0"/>
-              <a:t>Button attributes can be found @ </a:t>
-            </a:r>
+              <a:t>Element attributes can be found @ </a:t>
+            </a:r>
+          </a:p>
+          <a:p>
             <a:r>
               <a:rPr lang="en-US" sz="2400" dirty="0">
                 <a:hlinkClick r:id="rId2"/>
               </a:rPr>
-              <a:t>https://www.w3schools.com/tags/tag_button.asp</a:t>
-            </a:r>
-            <a:br>
-              <a:rPr lang="en-US" sz="2400" dirty="0"/>
-            </a:br>
+              <a:t>https://developer.mozilla.org/en-US/docs/Web/HTML/Element</a:t>
+            </a:r>
+            <a:endParaRPr lang="en-US" sz="2400" dirty="0"/>
+          </a:p>
+          <a:p>
             <a:r>
               <a:rPr lang="en-US" sz="2400" dirty="0">
                 <a:hlinkClick r:id="rId3"/>
               </a:rPr>
-              <a:t>https://developer.mozilla.org/en-US/docs/Web/HTML/Element/button</a:t>
-            </a:r>
-            <a:endParaRPr lang="en-US" sz="2400" dirty="0"/>
-          </a:p>
-          <a:p>
+              <a:t>https://www.w3schools.com/tags/</a:t>
+            </a:r>
             <a:endParaRPr lang="en-US" sz="2400" dirty="0"/>
           </a:p>
         </p:txBody>
@@ -26510,25 +26507,6 @@
 </file>
 
 <file path=customXml/item1.xml><?xml version="1.0" encoding="utf-8"?>
-<p:properties xmlns:p="http://schemas.microsoft.com/office/2006/metadata/properties" xmlns:xsi="http://www.w3.org/2001/XMLSchema-instance" xmlns:pc="http://schemas.microsoft.com/office/infopath/2007/PartnerControls">
-  <documentManagement>
-    <_ip_UnifiedCompliancePolicyUIAction xmlns="http://schemas.microsoft.com/sharepoint/v3" xsi:nil="true"/>
-    <Image xmlns="71af3243-3dd4-4a8d-8c0d-dd76da1f02a5">
-      <Url xsi:nil="true"/>
-      <Description xsi:nil="true"/>
-    </Image>
-    <Status xmlns="71af3243-3dd4-4a8d-8c0d-dd76da1f02a5">Not started</Status>
-    <_ip_UnifiedCompliancePolicyProperties xmlns="http://schemas.microsoft.com/sharepoint/v3" xsi:nil="true"/>
-    <lcf76f155ced4ddcb4097134ff3c332f xmlns="71af3243-3dd4-4a8d-8c0d-dd76da1f02a5">
-      <Terms xmlns="http://schemas.microsoft.com/office/infopath/2007/PartnerControls"/>
-    </lcf76f155ced4ddcb4097134ff3c332f>
-    <TaxCatchAll xmlns="230e9df3-be65-4c73-a93b-d1236ebd677e"/>
-    <MediaServiceKeyPoints xmlns="71af3243-3dd4-4a8d-8c0d-dd76da1f02a5" xsi:nil="true"/>
-  </documentManagement>
-</p:properties>
-</file>
-
-<file path=customXml/item2.xml><?xml version="1.0" encoding="utf-8"?>
 <ct:contentTypeSchema xmlns:ct="http://schemas.microsoft.com/office/2006/metadata/contentType" xmlns:ma="http://schemas.microsoft.com/office/2006/metadata/properties/metaAttributes" ct:_="" ma:_="" ma:contentTypeName="Document" ma:contentTypeID="0x01010079F111ED35F8CC479449609E8A0923A6" ma:contentTypeVersion="18" ma:contentTypeDescription="Create a new document." ma:contentTypeScope="" ma:versionID="22a266b9fa9a230c5a512669d8b298c3">
   <xsd:schema xmlns:xsd="http://www.w3.org/2001/XMLSchema" xmlns:xs="http://www.w3.org/2001/XMLSchema" xmlns:p="http://schemas.microsoft.com/office/2006/metadata/properties" xmlns:ns1="http://schemas.microsoft.com/sharepoint/v3" xmlns:ns2="71af3243-3dd4-4a8d-8c0d-dd76da1f02a5" xmlns:ns3="16c05727-aa75-4e4a-9b5f-8a80a1165891" xmlns:ns4="230e9df3-be65-4c73-a93b-d1236ebd677e" targetNamespace="http://schemas.microsoft.com/office/2006/metadata/properties" ma:root="true" ma:fieldsID="eddc33fff6b14141ee5c74a0d29ea6a1" ns1:_="" ns2:_="" ns3:_="" ns4:_="">
     <xsd:import namespace="http://schemas.microsoft.com/sharepoint/v3"/>
@@ -26804,6 +26782,25 @@
 </ct:contentTypeSchema>
 </file>
 
+<file path=customXml/item2.xml><?xml version="1.0" encoding="utf-8"?>
+<p:properties xmlns:p="http://schemas.microsoft.com/office/2006/metadata/properties" xmlns:xsi="http://www.w3.org/2001/XMLSchema-instance" xmlns:pc="http://schemas.microsoft.com/office/infopath/2007/PartnerControls">
+  <documentManagement>
+    <_ip_UnifiedCompliancePolicyUIAction xmlns="http://schemas.microsoft.com/sharepoint/v3" xsi:nil="true"/>
+    <Image xmlns="71af3243-3dd4-4a8d-8c0d-dd76da1f02a5">
+      <Url xsi:nil="true"/>
+      <Description xsi:nil="true"/>
+    </Image>
+    <Status xmlns="71af3243-3dd4-4a8d-8c0d-dd76da1f02a5">Not started</Status>
+    <_ip_UnifiedCompliancePolicyProperties xmlns="http://schemas.microsoft.com/sharepoint/v3" xsi:nil="true"/>
+    <lcf76f155ced4ddcb4097134ff3c332f xmlns="71af3243-3dd4-4a8d-8c0d-dd76da1f02a5">
+      <Terms xmlns="http://schemas.microsoft.com/office/infopath/2007/PartnerControls"/>
+    </lcf76f155ced4ddcb4097134ff3c332f>
+    <TaxCatchAll xmlns="230e9df3-be65-4c73-a93b-d1236ebd677e"/>
+    <MediaServiceKeyPoints xmlns="71af3243-3dd4-4a8d-8c0d-dd76da1f02a5" xsi:nil="true"/>
+  </documentManagement>
+</p:properties>
+</file>
+
 <file path=customXml/item3.xml><?xml version="1.0" encoding="utf-8"?>
 <?mso-contentType ?>
 <FormTemplates xmlns="http://schemas.microsoft.com/sharepoint/v3/contenttype/forms">
@@ -26814,18 +26811,6 @@
 </file>
 
 <file path=customXml/itemProps1.xml><?xml version="1.0" encoding="utf-8"?>
-<ds:datastoreItem xmlns:ds="http://schemas.openxmlformats.org/officeDocument/2006/customXml" ds:itemID="{538316A4-DB9D-4B40-83D1-0433996D54B0}">
-  <ds:schemaRefs>
-    <ds:schemaRef ds:uri="http://schemas.microsoft.com/office/2006/metadata/properties"/>
-    <ds:schemaRef ds:uri="http://schemas.microsoft.com/office/infopath/2007/PartnerControls"/>
-    <ds:schemaRef ds:uri="http://schemas.microsoft.com/sharepoint/v3"/>
-    <ds:schemaRef ds:uri="71af3243-3dd4-4a8d-8c0d-dd76da1f02a5"/>
-    <ds:schemaRef ds:uri="230e9df3-be65-4c73-a93b-d1236ebd677e"/>
-  </ds:schemaRefs>
-</ds:datastoreItem>
-</file>
-
-<file path=customXml/itemProps2.xml><?xml version="1.0" encoding="utf-8"?>
 <ds:datastoreItem xmlns:ds="http://schemas.openxmlformats.org/officeDocument/2006/customXml" ds:itemID="{1E5C9C91-7BEA-497B-8B74-808BB0864508}">
   <ds:schemaRefs>
     <ds:schemaRef ds:uri="http://schemas.microsoft.com/office/2006/metadata/contentType"/>
@@ -26846,6 +26831,18 @@
 </ds:datastoreItem>
 </file>
 
+<file path=customXml/itemProps2.xml><?xml version="1.0" encoding="utf-8"?>
+<ds:datastoreItem xmlns:ds="http://schemas.openxmlformats.org/officeDocument/2006/customXml" ds:itemID="{538316A4-DB9D-4B40-83D1-0433996D54B0}">
+  <ds:schemaRefs>
+    <ds:schemaRef ds:uri="http://schemas.microsoft.com/office/2006/metadata/properties"/>
+    <ds:schemaRef ds:uri="http://schemas.microsoft.com/office/infopath/2007/PartnerControls"/>
+    <ds:schemaRef ds:uri="http://schemas.microsoft.com/sharepoint/v3"/>
+    <ds:schemaRef ds:uri="71af3243-3dd4-4a8d-8c0d-dd76da1f02a5"/>
+    <ds:schemaRef ds:uri="230e9df3-be65-4c73-a93b-d1236ebd677e"/>
+  </ds:schemaRefs>
+</ds:datastoreItem>
+</file>
+
 <file path=customXml/itemProps3.xml><?xml version="1.0" encoding="utf-8"?>
 <ds:datastoreItem xmlns:ds="http://schemas.openxmlformats.org/officeDocument/2006/customXml" ds:itemID="{F49FD94B-CF2B-4485-954E-6805E96E51FA}">
   <ds:schemaRefs>

</xml_diff>

<commit_message>
Update to include github
</commit_message>
<xml_diff>
--- a/Angular/AngularPart2.pptx
+++ b/Angular/AngularPart2.pptx
@@ -5,30 +5,31 @@
     <p:sldMasterId id="2147484519" r:id="rId4"/>
   </p:sldMasterIdLst>
   <p:notesMasterIdLst>
-    <p:notesMasterId r:id="rId23"/>
+    <p:notesMasterId r:id="rId24"/>
   </p:notesMasterIdLst>
   <p:handoutMasterIdLst>
-    <p:handoutMasterId r:id="rId24"/>
+    <p:handoutMasterId r:id="rId25"/>
   </p:handoutMasterIdLst>
   <p:sldIdLst>
     <p:sldId id="256" r:id="rId5"/>
     <p:sldId id="310" r:id="rId6"/>
     <p:sldId id="393" r:id="rId7"/>
-    <p:sldId id="396" r:id="rId8"/>
-    <p:sldId id="397" r:id="rId9"/>
-    <p:sldId id="398" r:id="rId10"/>
-    <p:sldId id="399" r:id="rId11"/>
-    <p:sldId id="400" r:id="rId12"/>
-    <p:sldId id="401" r:id="rId13"/>
-    <p:sldId id="402" r:id="rId14"/>
-    <p:sldId id="403" r:id="rId15"/>
-    <p:sldId id="404" r:id="rId16"/>
-    <p:sldId id="405" r:id="rId17"/>
-    <p:sldId id="406" r:id="rId18"/>
-    <p:sldId id="407" r:id="rId19"/>
-    <p:sldId id="408" r:id="rId20"/>
-    <p:sldId id="409" r:id="rId21"/>
-    <p:sldId id="274" r:id="rId22"/>
+    <p:sldId id="410" r:id="rId8"/>
+    <p:sldId id="396" r:id="rId9"/>
+    <p:sldId id="397" r:id="rId10"/>
+    <p:sldId id="398" r:id="rId11"/>
+    <p:sldId id="399" r:id="rId12"/>
+    <p:sldId id="400" r:id="rId13"/>
+    <p:sldId id="401" r:id="rId14"/>
+    <p:sldId id="402" r:id="rId15"/>
+    <p:sldId id="403" r:id="rId16"/>
+    <p:sldId id="404" r:id="rId17"/>
+    <p:sldId id="405" r:id="rId18"/>
+    <p:sldId id="406" r:id="rId19"/>
+    <p:sldId id="407" r:id="rId20"/>
+    <p:sldId id="408" r:id="rId21"/>
+    <p:sldId id="409" r:id="rId22"/>
+    <p:sldId id="274" r:id="rId23"/>
   </p:sldIdLst>
   <p:sldSz cx="12192000" cy="6858000"/>
   <p:notesSz cx="6858000" cy="9144000"/>
@@ -842,7 +843,7 @@
           <a:p>
             <a:fld id="{96702109-9DB5-4930-9529-97D0F7F71D9D}" type="slidenum">
               <a:rPr lang="en-US" smtClean="0"/>
-              <a:t>14</a:t>
+              <a:t>15</a:t>
             </a:fld>
             <a:endParaRPr lang="en-US" dirty="0"/>
           </a:p>
@@ -926,7 +927,7 @@
           <a:p>
             <a:fld id="{96702109-9DB5-4930-9529-97D0F7F71D9D}" type="slidenum">
               <a:rPr lang="en-US" smtClean="0"/>
-              <a:t>15</a:t>
+              <a:t>16</a:t>
             </a:fld>
             <a:endParaRPr lang="en-US" dirty="0"/>
           </a:p>
@@ -1010,7 +1011,7 @@
           <a:p>
             <a:fld id="{96702109-9DB5-4930-9529-97D0F7F71D9D}" type="slidenum">
               <a:rPr lang="en-US" smtClean="0"/>
-              <a:t>16</a:t>
+              <a:t>17</a:t>
             </a:fld>
             <a:endParaRPr lang="en-US" dirty="0"/>
           </a:p>
@@ -1094,7 +1095,7 @@
           <a:p>
             <a:fld id="{96702109-9DB5-4930-9529-97D0F7F71D9D}" type="slidenum">
               <a:rPr lang="en-US" smtClean="0"/>
-              <a:t>17</a:t>
+              <a:t>18</a:t>
             </a:fld>
             <a:endParaRPr lang="en-US" dirty="0"/>
           </a:p>
@@ -1195,7 +1196,7 @@
           <a:p>
             <a:fld id="{EE85D185-D876-4A4B-A351-E623992245C2}" type="slidenum">
               <a:rPr lang="en-US" smtClean="0"/>
-              <a:t>18</a:t>
+              <a:t>19</a:t>
             </a:fld>
             <a:endParaRPr lang="en-US" dirty="0"/>
           </a:p>
@@ -15492,14 +15493,14 @@
             <a:pPr algn="ctr"/>
             <a:r>
               <a:rPr lang="en-US" dirty="0"/>
-              <a:t>Event Binding</a:t>
+              <a:t>Data Binding</a:t>
             </a:r>
             <a:br>
               <a:rPr lang="en-US" dirty="0"/>
             </a:br>
             <a:r>
               <a:rPr lang="en-US" dirty="0"/>
-              <a:t>Event Binding: (target) = “statement” </a:t>
+              <a:t>Attribute vs Property Binding </a:t>
             </a:r>
             <a:endParaRPr lang="en-US" sz="3100" dirty="0"/>
           </a:p>
@@ -15530,6 +15531,433 @@
               <a:rPr lang="en-US" smtClean="0"/>
               <a:pPr/>
               <a:t>10</a:t>
+            </a:fld>
+            <a:endParaRPr lang="en-US" dirty="0"/>
+          </a:p>
+        </p:txBody>
+      </p:sp>
+      <p:sp>
+        <p:nvSpPr>
+          <p:cNvPr id="10" name="TextBox 9">
+            <a:extLst>
+              <a:ext uri="{FF2B5EF4-FFF2-40B4-BE49-F238E27FC236}">
+                <a16:creationId xmlns:a16="http://schemas.microsoft.com/office/drawing/2014/main" id="{405B421A-02F4-2CC4-FF3F-D83CFCC804D2}"/>
+              </a:ext>
+            </a:extLst>
+          </p:cNvPr>
+          <p:cNvSpPr txBox="1"/>
+          <p:nvPr/>
+        </p:nvSpPr>
+        <p:spPr>
+          <a:xfrm>
+            <a:off x="493486" y="1560286"/>
+            <a:ext cx="10805885" cy="3908762"/>
+          </a:xfrm>
+          <a:prstGeom prst="rect">
+            <a:avLst/>
+          </a:prstGeom>
+          <a:noFill/>
+        </p:spPr>
+        <p:txBody>
+          <a:bodyPr wrap="square" rtlCol="0">
+            <a:spAutoFit/>
+          </a:bodyPr>
+          <a:lstStyle/>
+          <a:p>
+            <a:pPr marL="342900" indent="-342900">
+              <a:buFont typeface="Wingdings" panose="05000000000000000000" pitchFamily="2" charset="2"/>
+              <a:buChar char="q"/>
+            </a:pPr>
+            <a:r>
+              <a:rPr lang="en-US" sz="2400" dirty="0"/>
+              <a:t>Attribute binding </a:t>
+            </a:r>
+            <a:r>
+              <a:rPr lang="en-US" sz="2400" b="1" u="sng" dirty="0"/>
+              <a:t>binds HTML attribute</a:t>
+            </a:r>
+            <a:r>
+              <a:rPr lang="en-US" sz="2400" dirty="0"/>
+              <a:t> and is prefix with </a:t>
+            </a:r>
+            <a:r>
+              <a:rPr lang="en-US" sz="2400" dirty="0" err="1"/>
+              <a:t>attr</a:t>
+            </a:r>
+            <a:r>
+              <a:rPr lang="en-US" sz="2400" dirty="0"/>
+              <a:t>. such as</a:t>
+            </a:r>
+            <a:br>
+              <a:rPr lang="en-US" sz="2400" dirty="0"/>
+            </a:br>
+            <a:r>
+              <a:rPr lang="en-US" sz="2400" dirty="0">
+                <a:solidFill>
+                  <a:srgbClr val="0000FF"/>
+                </a:solidFill>
+                <a:latin typeface="Cascadia Mono" panose="020B0609020000020004" pitchFamily="49" charset="0"/>
+              </a:rPr>
+              <a:t>&lt;</a:t>
+            </a:r>
+            <a:r>
+              <a:rPr lang="en-US" sz="2400" dirty="0">
+                <a:solidFill>
+                  <a:srgbClr val="800000"/>
+                </a:solidFill>
+                <a:latin typeface="Cascadia Mono" panose="020B0609020000020004" pitchFamily="49" charset="0"/>
+              </a:rPr>
+              <a:t>button</a:t>
+            </a:r>
+            <a:r>
+              <a:rPr lang="en-US" sz="2400" dirty="0">
+                <a:solidFill>
+                  <a:srgbClr val="000000"/>
+                </a:solidFill>
+                <a:latin typeface="Cascadia Mono" panose="020B0609020000020004" pitchFamily="49" charset="0"/>
+              </a:rPr>
+              <a:t> </a:t>
+            </a:r>
+            <a:r>
+              <a:rPr lang="en-US" sz="2400" dirty="0">
+                <a:solidFill>
+                  <a:srgbClr val="FF0000"/>
+                </a:solidFill>
+                <a:latin typeface="Cascadia Mono" panose="020B0609020000020004" pitchFamily="49" charset="0"/>
+              </a:rPr>
+              <a:t>[</a:t>
+            </a:r>
+            <a:r>
+              <a:rPr lang="en-US" sz="2400" dirty="0" err="1">
+                <a:solidFill>
+                  <a:srgbClr val="FF0000"/>
+                </a:solidFill>
+                <a:latin typeface="Cascadia Mono" panose="020B0609020000020004" pitchFamily="49" charset="0"/>
+              </a:rPr>
+              <a:t>attr.disabled</a:t>
+            </a:r>
+            <a:r>
+              <a:rPr lang="en-US" sz="2400" dirty="0">
+                <a:solidFill>
+                  <a:srgbClr val="FF0000"/>
+                </a:solidFill>
+                <a:latin typeface="Cascadia Mono" panose="020B0609020000020004" pitchFamily="49" charset="0"/>
+              </a:rPr>
+              <a:t>]</a:t>
+            </a:r>
+            <a:r>
+              <a:rPr lang="en-US" sz="2400" dirty="0">
+                <a:solidFill>
+                  <a:srgbClr val="0000FF"/>
+                </a:solidFill>
+                <a:latin typeface="Cascadia Mono" panose="020B0609020000020004" pitchFamily="49" charset="0"/>
+              </a:rPr>
+              <a:t>="</a:t>
+            </a:r>
+            <a:r>
+              <a:rPr lang="en-US" sz="2400" dirty="0" err="1">
+                <a:solidFill>
+                  <a:srgbClr val="0000FF"/>
+                </a:solidFill>
+                <a:latin typeface="Cascadia Mono" panose="020B0609020000020004" pitchFamily="49" charset="0"/>
+              </a:rPr>
+              <a:t>getButtonState</a:t>
+            </a:r>
+            <a:r>
+              <a:rPr lang="en-US" sz="2400" dirty="0">
+                <a:solidFill>
+                  <a:srgbClr val="0000FF"/>
+                </a:solidFill>
+                <a:latin typeface="Cascadia Mono" panose="020B0609020000020004" pitchFamily="49" charset="0"/>
+              </a:rPr>
+              <a:t>()"&gt;&lt;/</a:t>
+            </a:r>
+            <a:r>
+              <a:rPr lang="en-US" sz="2400" dirty="0">
+                <a:solidFill>
+                  <a:srgbClr val="800000"/>
+                </a:solidFill>
+                <a:latin typeface="Cascadia Mono" panose="020B0609020000020004" pitchFamily="49" charset="0"/>
+              </a:rPr>
+              <a:t>button</a:t>
+            </a:r>
+            <a:r>
+              <a:rPr lang="en-US" sz="2400" dirty="0">
+                <a:solidFill>
+                  <a:srgbClr val="0000FF"/>
+                </a:solidFill>
+                <a:latin typeface="Cascadia Mono" panose="020B0609020000020004" pitchFamily="49" charset="0"/>
+              </a:rPr>
+              <a:t>&gt;</a:t>
+            </a:r>
+            <a:endParaRPr lang="en-US" sz="3200" dirty="0"/>
+          </a:p>
+          <a:p>
+            <a:pPr marL="342900" indent="-342900">
+              <a:buFont typeface="Wingdings" panose="05000000000000000000" pitchFamily="2" charset="2"/>
+              <a:buChar char="q"/>
+            </a:pPr>
+            <a:endParaRPr lang="en-US" sz="2400" dirty="0"/>
+          </a:p>
+          <a:p>
+            <a:pPr marL="342900" indent="-342900">
+              <a:buFont typeface="Wingdings" panose="05000000000000000000" pitchFamily="2" charset="2"/>
+              <a:buChar char="q"/>
+            </a:pPr>
+            <a:r>
+              <a:rPr lang="en-US" sz="2400" dirty="0"/>
+              <a:t>Property binding </a:t>
+            </a:r>
+            <a:r>
+              <a:rPr lang="en-US" sz="2400" b="1" u="sng" dirty="0"/>
+              <a:t>binds DOM object property</a:t>
+            </a:r>
+            <a:r>
+              <a:rPr lang="en-US" sz="2400" dirty="0"/>
+              <a:t> such as</a:t>
+            </a:r>
+            <a:br>
+              <a:rPr lang="en-US" sz="2400" dirty="0"/>
+            </a:br>
+            <a:r>
+              <a:rPr lang="en-US" sz="2400" dirty="0">
+                <a:solidFill>
+                  <a:srgbClr val="0000FF"/>
+                </a:solidFill>
+                <a:latin typeface="Cascadia Mono" panose="020B0609020000020004" pitchFamily="49" charset="0"/>
+              </a:rPr>
+              <a:t>&lt;</a:t>
+            </a:r>
+            <a:r>
+              <a:rPr lang="en-US" sz="2400" dirty="0">
+                <a:solidFill>
+                  <a:srgbClr val="800000"/>
+                </a:solidFill>
+                <a:latin typeface="Cascadia Mono" panose="020B0609020000020004" pitchFamily="49" charset="0"/>
+              </a:rPr>
+              <a:t>button</a:t>
+            </a:r>
+            <a:r>
+              <a:rPr lang="en-US" sz="2400" dirty="0">
+                <a:solidFill>
+                  <a:srgbClr val="000000"/>
+                </a:solidFill>
+                <a:latin typeface="Cascadia Mono" panose="020B0609020000020004" pitchFamily="49" charset="0"/>
+              </a:rPr>
+              <a:t> </a:t>
+            </a:r>
+            <a:r>
+              <a:rPr lang="en-US" sz="2400" dirty="0">
+                <a:solidFill>
+                  <a:srgbClr val="FF0000"/>
+                </a:solidFill>
+                <a:latin typeface="Cascadia Mono" panose="020B0609020000020004" pitchFamily="49" charset="0"/>
+              </a:rPr>
+              <a:t>[disabled]</a:t>
+            </a:r>
+            <a:r>
+              <a:rPr lang="en-US" sz="2400" dirty="0">
+                <a:solidFill>
+                  <a:srgbClr val="0000FF"/>
+                </a:solidFill>
+                <a:latin typeface="Cascadia Mono" panose="020B0609020000020004" pitchFamily="49" charset="0"/>
+              </a:rPr>
+              <a:t>="</a:t>
+            </a:r>
+            <a:r>
+              <a:rPr lang="en-US" sz="2400" dirty="0" err="1">
+                <a:solidFill>
+                  <a:srgbClr val="0000FF"/>
+                </a:solidFill>
+                <a:latin typeface="Cascadia Mono" panose="020B0609020000020004" pitchFamily="49" charset="0"/>
+              </a:rPr>
+              <a:t>getButtonState</a:t>
+            </a:r>
+            <a:r>
+              <a:rPr lang="en-US" sz="2400" dirty="0">
+                <a:solidFill>
+                  <a:srgbClr val="0000FF"/>
+                </a:solidFill>
+                <a:latin typeface="Cascadia Mono" panose="020B0609020000020004" pitchFamily="49" charset="0"/>
+              </a:rPr>
+              <a:t>()"&gt;&lt;/</a:t>
+            </a:r>
+            <a:r>
+              <a:rPr lang="en-US" sz="2400" dirty="0">
+                <a:solidFill>
+                  <a:srgbClr val="800000"/>
+                </a:solidFill>
+                <a:latin typeface="Cascadia Mono" panose="020B0609020000020004" pitchFamily="49" charset="0"/>
+              </a:rPr>
+              <a:t>button</a:t>
+            </a:r>
+            <a:r>
+              <a:rPr lang="en-US" sz="2400" dirty="0">
+                <a:solidFill>
+                  <a:srgbClr val="0000FF"/>
+                </a:solidFill>
+                <a:latin typeface="Cascadia Mono" panose="020B0609020000020004" pitchFamily="49" charset="0"/>
+              </a:rPr>
+              <a:t>&gt;</a:t>
+            </a:r>
+            <a:endParaRPr lang="en-US" sz="3200" dirty="0">
+              <a:solidFill>
+                <a:srgbClr val="0000FF"/>
+              </a:solidFill>
+              <a:latin typeface="Cascadia Mono" panose="020B0609020000020004" pitchFamily="49" charset="0"/>
+            </a:endParaRPr>
+          </a:p>
+          <a:p>
+            <a:pPr marL="342900" indent="-342900">
+              <a:buFont typeface="Wingdings" panose="05000000000000000000" pitchFamily="2" charset="2"/>
+              <a:buChar char="q"/>
+            </a:pPr>
+            <a:endParaRPr lang="en-US" sz="3200" dirty="0">
+              <a:solidFill>
+                <a:srgbClr val="0000FF"/>
+              </a:solidFill>
+              <a:latin typeface="Cascadia Mono" panose="020B0609020000020004" pitchFamily="49" charset="0"/>
+            </a:endParaRPr>
+          </a:p>
+          <a:p>
+            <a:pPr marL="342900" indent="-342900">
+              <a:buFont typeface="Wingdings" panose="05000000000000000000" pitchFamily="2" charset="2"/>
+              <a:buChar char="q"/>
+            </a:pPr>
+            <a:r>
+              <a:rPr lang="en-US" sz="2400" dirty="0"/>
+              <a:t>Attribute and Property </a:t>
+            </a:r>
+            <a:r>
+              <a:rPr lang="en-US" sz="2400" b="1" u="sng" dirty="0"/>
+              <a:t>usually but not always</a:t>
+            </a:r>
+            <a:r>
+              <a:rPr lang="en-US" sz="2400" dirty="0"/>
+              <a:t> have the same name such as attribute </a:t>
+            </a:r>
+            <a:r>
+              <a:rPr lang="en-US" sz="2400" dirty="0" err="1"/>
+              <a:t>rowspan</a:t>
+            </a:r>
+            <a:r>
+              <a:rPr lang="en-US" sz="2400" dirty="0"/>
+              <a:t> vs property </a:t>
+            </a:r>
+            <a:r>
+              <a:rPr lang="en-US" sz="2400" dirty="0" err="1"/>
+              <a:t>rowSpan</a:t>
+            </a:r>
+            <a:r>
+              <a:rPr lang="en-US" sz="2400" dirty="0"/>
+              <a:t>. Their semantic/meaning is the same but syntactically is different.</a:t>
+            </a:r>
+            <a:endParaRPr lang="en-US" sz="3200" dirty="0"/>
+          </a:p>
+          <a:p>
+            <a:endParaRPr lang="en-US" sz="2400" dirty="0"/>
+          </a:p>
+        </p:txBody>
+      </p:sp>
+    </p:spTree>
+    <p:extLst>
+      <p:ext uri="{BB962C8B-B14F-4D97-AF65-F5344CB8AC3E}">
+        <p14:creationId xmlns:p14="http://schemas.microsoft.com/office/powerpoint/2010/main" val="3029076899"/>
+      </p:ext>
+    </p:extLst>
+  </p:cSld>
+  <p:clrMapOvr>
+    <a:masterClrMapping/>
+  </p:clrMapOvr>
+</p:sld>
+</file>
+
+<file path=ppt/slides/slide11.xml><?xml version="1.0" encoding="utf-8"?>
+<p:sld xmlns:a="http://schemas.openxmlformats.org/drawingml/2006/main" xmlns:r="http://schemas.openxmlformats.org/officeDocument/2006/relationships" xmlns:p="http://schemas.openxmlformats.org/presentationml/2006/main">
+  <p:cSld>
+    <p:spTree>
+      <p:nvGrpSpPr>
+        <p:cNvPr id="1" name=""/>
+        <p:cNvGrpSpPr/>
+        <p:nvPr/>
+      </p:nvGrpSpPr>
+      <p:grpSpPr>
+        <a:xfrm>
+          <a:off x="0" y="0"/>
+          <a:ext cx="0" cy="0"/>
+          <a:chOff x="0" y="0"/>
+          <a:chExt cx="0" cy="0"/>
+        </a:xfrm>
+      </p:grpSpPr>
+      <p:sp>
+        <p:nvSpPr>
+          <p:cNvPr id="2" name="Title 1">
+            <a:extLst>
+              <a:ext uri="{FF2B5EF4-FFF2-40B4-BE49-F238E27FC236}">
+                <a16:creationId xmlns:a16="http://schemas.microsoft.com/office/drawing/2014/main" id="{85D263CF-A796-7EAD-540C-EB09D06BA351}"/>
+              </a:ext>
+            </a:extLst>
+          </p:cNvPr>
+          <p:cNvSpPr>
+            <a:spLocks noGrp="1"/>
+          </p:cNvSpPr>
+          <p:nvPr>
+            <p:ph type="title"/>
+          </p:nvPr>
+        </p:nvSpPr>
+        <p:spPr>
+          <a:xfrm>
+            <a:off x="291547" y="187537"/>
+            <a:ext cx="11403495" cy="908686"/>
+          </a:xfrm>
+        </p:spPr>
+        <p:txBody>
+          <a:bodyPr>
+            <a:normAutofit fontScale="90000"/>
+          </a:bodyPr>
+          <a:lstStyle/>
+          <a:p>
+            <a:pPr algn="ctr"/>
+            <a:r>
+              <a:rPr lang="en-US" dirty="0"/>
+              <a:t>Event Binding</a:t>
+            </a:r>
+            <a:br>
+              <a:rPr lang="en-US" dirty="0"/>
+            </a:br>
+            <a:r>
+              <a:rPr lang="en-US" dirty="0"/>
+              <a:t>Event Binding: (target) = “statement” </a:t>
+            </a:r>
+            <a:endParaRPr lang="en-US" sz="3100" dirty="0"/>
+          </a:p>
+        </p:txBody>
+      </p:sp>
+      <p:sp>
+        <p:nvSpPr>
+          <p:cNvPr id="7" name="Slide Number Placeholder 6">
+            <a:extLst>
+              <a:ext uri="{FF2B5EF4-FFF2-40B4-BE49-F238E27FC236}">
+                <a16:creationId xmlns:a16="http://schemas.microsoft.com/office/drawing/2014/main" id="{EFEF5E5D-61DE-8FE4-6915-D64316034217}"/>
+              </a:ext>
+            </a:extLst>
+          </p:cNvPr>
+          <p:cNvSpPr>
+            <a:spLocks noGrp="1"/>
+          </p:cNvSpPr>
+          <p:nvPr>
+            <p:ph type="sldNum" sz="quarter" idx="12"/>
+          </p:nvPr>
+        </p:nvSpPr>
+        <p:spPr/>
+        <p:txBody>
+          <a:bodyPr/>
+          <a:lstStyle/>
+          <a:p>
+            <a:fld id="{11A71338-8BA2-4C79-A6C5-5A8E30081D0C}" type="slidenum">
+              <a:rPr lang="en-US" smtClean="0"/>
+              <a:pPr/>
+              <a:t>11</a:t>
             </a:fld>
             <a:endParaRPr lang="en-US" dirty="0"/>
           </a:p>
@@ -16098,7 +16526,7 @@
 </p:sld>
 </file>
 
-<file path=ppt/slides/slide11.xml><?xml version="1.0" encoding="utf-8"?>
+<file path=ppt/slides/slide12.xml><?xml version="1.0" encoding="utf-8"?>
 <p:sld xmlns:a="http://schemas.openxmlformats.org/drawingml/2006/main" xmlns:r="http://schemas.openxmlformats.org/officeDocument/2006/relationships" xmlns:p="http://schemas.openxmlformats.org/presentationml/2006/main">
   <p:cSld>
     <p:spTree>
@@ -16175,7 +16603,7 @@
             <a:fld id="{11A71338-8BA2-4C79-A6C5-5A8E30081D0C}" type="slidenum">
               <a:rPr lang="en-US" smtClean="0"/>
               <a:pPr/>
-              <a:t>11</a:t>
+              <a:t>12</a:t>
             </a:fld>
             <a:endParaRPr lang="en-US" dirty="0"/>
           </a:p>
@@ -16351,425 +16779,6 @@
     <p:extLst>
       <p:ext uri="{BB962C8B-B14F-4D97-AF65-F5344CB8AC3E}">
         <p14:creationId xmlns:p14="http://schemas.microsoft.com/office/powerpoint/2010/main" val="1712666654"/>
-      </p:ext>
-    </p:extLst>
-  </p:cSld>
-  <p:clrMapOvr>
-    <a:masterClrMapping/>
-  </p:clrMapOvr>
-</p:sld>
-</file>
-
-<file path=ppt/slides/slide12.xml><?xml version="1.0" encoding="utf-8"?>
-<p:sld xmlns:a="http://schemas.openxmlformats.org/drawingml/2006/main" xmlns:r="http://schemas.openxmlformats.org/officeDocument/2006/relationships" xmlns:p="http://schemas.openxmlformats.org/presentationml/2006/main">
-  <p:cSld>
-    <p:spTree>
-      <p:nvGrpSpPr>
-        <p:cNvPr id="1" name=""/>
-        <p:cNvGrpSpPr/>
-        <p:nvPr/>
-      </p:nvGrpSpPr>
-      <p:grpSpPr>
-        <a:xfrm>
-          <a:off x="0" y="0"/>
-          <a:ext cx="0" cy="0"/>
-          <a:chOff x="0" y="0"/>
-          <a:chExt cx="0" cy="0"/>
-        </a:xfrm>
-      </p:grpSpPr>
-      <p:sp>
-        <p:nvSpPr>
-          <p:cNvPr id="2" name="Title 1">
-            <a:extLst>
-              <a:ext uri="{FF2B5EF4-FFF2-40B4-BE49-F238E27FC236}">
-                <a16:creationId xmlns:a16="http://schemas.microsoft.com/office/drawing/2014/main" id="{85D263CF-A796-7EAD-540C-EB09D06BA351}"/>
-              </a:ext>
-            </a:extLst>
-          </p:cNvPr>
-          <p:cNvSpPr>
-            <a:spLocks noGrp="1"/>
-          </p:cNvSpPr>
-          <p:nvPr>
-            <p:ph type="title"/>
-          </p:nvPr>
-        </p:nvSpPr>
-        <p:spPr>
-          <a:xfrm>
-            <a:off x="291547" y="187537"/>
-            <a:ext cx="11403495" cy="821206"/>
-          </a:xfrm>
-        </p:spPr>
-        <p:txBody>
-          <a:bodyPr>
-            <a:normAutofit fontScale="90000"/>
-          </a:bodyPr>
-          <a:lstStyle/>
-          <a:p>
-            <a:pPr algn="ctr"/>
-            <a:r>
-              <a:rPr lang="en-US" sz="3200" dirty="0"/>
-              <a:t>Directives</a:t>
-            </a:r>
-            <a:br>
-              <a:rPr lang="en-US" sz="3200" dirty="0"/>
-            </a:br>
-            <a:r>
-              <a:rPr lang="en-US" sz="3200" dirty="0"/>
-              <a:t>Component Directives</a:t>
-            </a:r>
-          </a:p>
-        </p:txBody>
-      </p:sp>
-      <p:sp>
-        <p:nvSpPr>
-          <p:cNvPr id="7" name="Slide Number Placeholder 6">
-            <a:extLst>
-              <a:ext uri="{FF2B5EF4-FFF2-40B4-BE49-F238E27FC236}">
-                <a16:creationId xmlns:a16="http://schemas.microsoft.com/office/drawing/2014/main" id="{EFEF5E5D-61DE-8FE4-6915-D64316034217}"/>
-              </a:ext>
-            </a:extLst>
-          </p:cNvPr>
-          <p:cNvSpPr>
-            <a:spLocks noGrp="1"/>
-          </p:cNvSpPr>
-          <p:nvPr>
-            <p:ph type="sldNum" sz="quarter" idx="12"/>
-          </p:nvPr>
-        </p:nvSpPr>
-        <p:spPr/>
-        <p:txBody>
-          <a:bodyPr/>
-          <a:lstStyle/>
-          <a:p>
-            <a:fld id="{11A71338-8BA2-4C79-A6C5-5A8E30081D0C}" type="slidenum">
-              <a:rPr lang="en-US" smtClean="0"/>
-              <a:pPr/>
-              <a:t>12</a:t>
-            </a:fld>
-            <a:endParaRPr lang="en-US" dirty="0"/>
-          </a:p>
-        </p:txBody>
-      </p:sp>
-      <p:sp>
-        <p:nvSpPr>
-          <p:cNvPr id="10" name="TextBox 9">
-            <a:extLst>
-              <a:ext uri="{FF2B5EF4-FFF2-40B4-BE49-F238E27FC236}">
-                <a16:creationId xmlns:a16="http://schemas.microsoft.com/office/drawing/2014/main" id="{405B421A-02F4-2CC4-FF3F-D83CFCC804D2}"/>
-              </a:ext>
-            </a:extLst>
-          </p:cNvPr>
-          <p:cNvSpPr txBox="1"/>
-          <p:nvPr/>
-        </p:nvSpPr>
-        <p:spPr>
-          <a:xfrm>
-            <a:off x="328375" y="1391814"/>
-            <a:ext cx="11661509" cy="4062651"/>
-          </a:xfrm>
-          <a:prstGeom prst="rect">
-            <a:avLst/>
-          </a:prstGeom>
-          <a:noFill/>
-        </p:spPr>
-        <p:txBody>
-          <a:bodyPr wrap="square" rtlCol="0">
-            <a:spAutoFit/>
-          </a:bodyPr>
-          <a:lstStyle/>
-          <a:p>
-            <a:r>
-              <a:rPr lang="en-US" sz="1800" dirty="0">
-                <a:solidFill>
-                  <a:srgbClr val="000000"/>
-                </a:solidFill>
-                <a:latin typeface="Cascadia Mono" panose="020B0609020000020004" pitchFamily="49" charset="0"/>
-              </a:rPr>
-              <a:t>@</a:t>
-            </a:r>
-            <a:r>
-              <a:rPr lang="en-US" sz="1800" dirty="0">
-                <a:solidFill>
-                  <a:srgbClr val="2B91AF"/>
-                </a:solidFill>
-                <a:latin typeface="Cascadia Mono" panose="020B0609020000020004" pitchFamily="49" charset="0"/>
-              </a:rPr>
-              <a:t>Component</a:t>
-            </a:r>
-            <a:r>
-              <a:rPr lang="en-US" sz="1800" dirty="0">
-                <a:solidFill>
-                  <a:srgbClr val="000000"/>
-                </a:solidFill>
-                <a:latin typeface="Cascadia Mono" panose="020B0609020000020004" pitchFamily="49" charset="0"/>
-              </a:rPr>
-              <a:t>({</a:t>
-            </a:r>
-          </a:p>
-          <a:p>
-            <a:r>
-              <a:rPr lang="en-US" sz="1800" dirty="0">
-                <a:solidFill>
-                  <a:srgbClr val="000000"/>
-                </a:solidFill>
-                <a:latin typeface="Cascadia Mono" panose="020B0609020000020004" pitchFamily="49" charset="0"/>
-              </a:rPr>
-              <a:t>  selector: </a:t>
-            </a:r>
-            <a:r>
-              <a:rPr lang="en-US" sz="1800" dirty="0">
-                <a:solidFill>
-                  <a:srgbClr val="A31515"/>
-                </a:solidFill>
-                <a:latin typeface="Cascadia Mono" panose="020B0609020000020004" pitchFamily="49" charset="0"/>
-              </a:rPr>
-              <a:t>'app-root’</a:t>
-            </a:r>
-            <a:r>
-              <a:rPr lang="en-US" sz="1800" dirty="0">
-                <a:solidFill>
-                  <a:srgbClr val="000000"/>
-                </a:solidFill>
-                <a:latin typeface="Cascadia Mono" panose="020B0609020000020004" pitchFamily="49" charset="0"/>
-              </a:rPr>
-              <a:t>,</a:t>
-            </a:r>
-          </a:p>
-          <a:p>
-            <a:r>
-              <a:rPr lang="en-US" sz="1800" dirty="0">
-                <a:solidFill>
-                  <a:srgbClr val="000000"/>
-                </a:solidFill>
-                <a:latin typeface="Cascadia Mono" panose="020B0609020000020004" pitchFamily="49" charset="0"/>
-              </a:rPr>
-              <a:t>  </a:t>
-            </a:r>
-            <a:r>
-              <a:rPr lang="en-US" sz="1800" dirty="0" err="1">
-                <a:solidFill>
-                  <a:srgbClr val="000000"/>
-                </a:solidFill>
-                <a:latin typeface="Cascadia Mono" panose="020B0609020000020004" pitchFamily="49" charset="0"/>
-              </a:rPr>
-              <a:t>templateUrl</a:t>
-            </a:r>
-            <a:r>
-              <a:rPr lang="en-US" sz="1800" dirty="0">
-                <a:solidFill>
-                  <a:srgbClr val="000000"/>
-                </a:solidFill>
-                <a:latin typeface="Cascadia Mono" panose="020B0609020000020004" pitchFamily="49" charset="0"/>
-              </a:rPr>
-              <a:t>: </a:t>
-            </a:r>
-            <a:r>
-              <a:rPr lang="en-US" sz="1800" dirty="0">
-                <a:solidFill>
-                  <a:srgbClr val="A31515"/>
-                </a:solidFill>
-                <a:latin typeface="Cascadia Mono" panose="020B0609020000020004" pitchFamily="49" charset="0"/>
-              </a:rPr>
-              <a:t>'./app.component.html'</a:t>
-            </a:r>
-            <a:r>
-              <a:rPr lang="en-US" sz="1800" dirty="0">
-                <a:solidFill>
-                  <a:srgbClr val="000000"/>
-                </a:solidFill>
-                <a:latin typeface="Cascadia Mono" panose="020B0609020000020004" pitchFamily="49" charset="0"/>
-              </a:rPr>
-              <a:t>,</a:t>
-            </a:r>
-          </a:p>
-          <a:p>
-            <a:r>
-              <a:rPr lang="en-US" sz="1800" dirty="0">
-                <a:solidFill>
-                  <a:srgbClr val="000000"/>
-                </a:solidFill>
-                <a:latin typeface="Cascadia Mono" panose="020B0609020000020004" pitchFamily="49" charset="0"/>
-              </a:rPr>
-              <a:t>  </a:t>
-            </a:r>
-            <a:r>
-              <a:rPr lang="en-US" sz="1800" dirty="0" err="1">
-                <a:solidFill>
-                  <a:srgbClr val="000000"/>
-                </a:solidFill>
-                <a:latin typeface="Cascadia Mono" panose="020B0609020000020004" pitchFamily="49" charset="0"/>
-              </a:rPr>
-              <a:t>styleUrl</a:t>
-            </a:r>
-            <a:r>
-              <a:rPr lang="en-US" sz="1800" dirty="0">
-                <a:solidFill>
-                  <a:srgbClr val="000000"/>
-                </a:solidFill>
-                <a:latin typeface="Cascadia Mono" panose="020B0609020000020004" pitchFamily="49" charset="0"/>
-              </a:rPr>
-              <a:t>: </a:t>
-            </a:r>
-            <a:r>
-              <a:rPr lang="en-US" sz="1800" dirty="0">
-                <a:solidFill>
-                  <a:srgbClr val="A31515"/>
-                </a:solidFill>
-                <a:latin typeface="Cascadia Mono" panose="020B0609020000020004" pitchFamily="49" charset="0"/>
-              </a:rPr>
-              <a:t>[‘./app.component.css’]</a:t>
-            </a:r>
-            <a:endParaRPr lang="en-US" sz="1800" dirty="0">
-              <a:solidFill>
-                <a:srgbClr val="000000"/>
-              </a:solidFill>
-              <a:latin typeface="Cascadia Mono" panose="020B0609020000020004" pitchFamily="49" charset="0"/>
-            </a:endParaRPr>
-          </a:p>
-          <a:p>
-            <a:r>
-              <a:rPr lang="en-US" sz="1800" dirty="0">
-                <a:solidFill>
-                  <a:srgbClr val="000000"/>
-                </a:solidFill>
-                <a:latin typeface="Cascadia Mono" panose="020B0609020000020004" pitchFamily="49" charset="0"/>
-              </a:rPr>
-              <a:t>}</a:t>
-            </a:r>
-            <a:endParaRPr lang="en-US" sz="2400" dirty="0">
-              <a:solidFill>
-                <a:srgbClr val="000000"/>
-              </a:solidFill>
-              <a:latin typeface="Cascadia Mono" panose="020B0609020000020004" pitchFamily="49" charset="0"/>
-            </a:endParaRPr>
-          </a:p>
-          <a:p>
-            <a:endParaRPr lang="en-US" sz="2400" dirty="0">
-              <a:solidFill>
-                <a:srgbClr val="000000"/>
-              </a:solidFill>
-            </a:endParaRPr>
-          </a:p>
-          <a:p>
-            <a:pPr marL="285750" indent="-285750">
-              <a:buFont typeface="Wingdings" panose="05000000000000000000" pitchFamily="2" charset="2"/>
-              <a:buChar char="q"/>
-            </a:pPr>
-            <a:r>
-              <a:rPr lang="en-US" sz="2400" dirty="0">
-                <a:solidFill>
-                  <a:srgbClr val="000000"/>
-                </a:solidFill>
-              </a:rPr>
-              <a:t>Selector: Tell Angular where to </a:t>
-            </a:r>
-            <a:r>
-              <a:rPr lang="en-US" sz="2400" b="1" u="sng" dirty="0">
-                <a:solidFill>
-                  <a:srgbClr val="000000"/>
-                </a:solidFill>
-              </a:rPr>
-              <a:t>create and insert</a:t>
-            </a:r>
-            <a:r>
-              <a:rPr lang="en-US" sz="2400" dirty="0">
-                <a:solidFill>
-                  <a:srgbClr val="000000"/>
-                </a:solidFill>
-              </a:rPr>
-              <a:t> this component  in the template HTML tag </a:t>
-            </a:r>
-            <a:r>
-              <a:rPr lang="en-US" sz="2400" dirty="0" err="1">
-                <a:solidFill>
-                  <a:srgbClr val="000000"/>
-                </a:solidFill>
-              </a:rPr>
-              <a:t>e.g</a:t>
-            </a:r>
-            <a:r>
-              <a:rPr lang="en-US" sz="2400" dirty="0">
-                <a:solidFill>
-                  <a:srgbClr val="000000"/>
-                </a:solidFill>
-              </a:rPr>
-              <a:t>: Insert this component between &lt;app-root&gt; tag</a:t>
-            </a:r>
-            <a:br>
-              <a:rPr lang="en-US" sz="2400" dirty="0">
-                <a:solidFill>
-                  <a:srgbClr val="000000"/>
-                </a:solidFill>
-              </a:rPr>
-            </a:br>
-            <a:endParaRPr lang="en-US" sz="2400" dirty="0">
-              <a:solidFill>
-                <a:srgbClr val="000000"/>
-              </a:solidFill>
-            </a:endParaRPr>
-          </a:p>
-          <a:p>
-            <a:pPr marL="285750" indent="-285750">
-              <a:buFont typeface="Wingdings" panose="05000000000000000000" pitchFamily="2" charset="2"/>
-              <a:buChar char="q"/>
-            </a:pPr>
-            <a:r>
-              <a:rPr lang="en-US" sz="2400" dirty="0" err="1">
-                <a:solidFill>
-                  <a:srgbClr val="000000"/>
-                </a:solidFill>
-              </a:rPr>
-              <a:t>templateUrl</a:t>
-            </a:r>
-            <a:r>
-              <a:rPr lang="en-US" sz="2400" dirty="0">
-                <a:solidFill>
-                  <a:srgbClr val="000000"/>
-                </a:solidFill>
-              </a:rPr>
-              <a:t>: Defines HTML template file which is used by this component</a:t>
-            </a:r>
-            <a:br>
-              <a:rPr lang="en-US" sz="2400" dirty="0">
-                <a:solidFill>
-                  <a:srgbClr val="000000"/>
-                </a:solidFill>
-              </a:rPr>
-            </a:br>
-            <a:endParaRPr lang="en-US" sz="2400" dirty="0">
-              <a:solidFill>
-                <a:srgbClr val="000000"/>
-              </a:solidFill>
-            </a:endParaRPr>
-          </a:p>
-          <a:p>
-            <a:pPr marL="285750" indent="-285750">
-              <a:buFont typeface="Wingdings" panose="05000000000000000000" pitchFamily="2" charset="2"/>
-              <a:buChar char="q"/>
-            </a:pPr>
-            <a:r>
-              <a:rPr lang="en-US" sz="2400" dirty="0" err="1">
-                <a:solidFill>
-                  <a:srgbClr val="000000"/>
-                </a:solidFill>
-              </a:rPr>
-              <a:t>styleUrl</a:t>
-            </a:r>
-            <a:r>
-              <a:rPr lang="en-US" sz="2400" dirty="0">
-                <a:solidFill>
-                  <a:srgbClr val="000000"/>
-                </a:solidFill>
-              </a:rPr>
-              <a:t>: Defines Style format file(s) which is used by this component</a:t>
-            </a:r>
-          </a:p>
-        </p:txBody>
-      </p:sp>
-    </p:spTree>
-    <p:extLst>
-      <p:ext uri="{BB962C8B-B14F-4D97-AF65-F5344CB8AC3E}">
-        <p14:creationId xmlns:p14="http://schemas.microsoft.com/office/powerpoint/2010/main" val="4268193180"/>
       </p:ext>
     </p:extLst>
   </p:cSld>
@@ -16834,15 +16843,7 @@
             </a:br>
             <a:r>
               <a:rPr lang="en-US" sz="3200" dirty="0"/>
-              <a:t>Structural Directives - *</a:t>
-            </a:r>
-            <a:r>
-              <a:rPr lang="en-US" sz="3200" dirty="0" err="1"/>
-              <a:t>ngIf</a:t>
-            </a:r>
-            <a:r>
-              <a:rPr lang="en-US" sz="3200" dirty="0"/>
-              <a:t> or @if</a:t>
+              <a:t>Component Directives</a:t>
             </a:r>
           </a:p>
         </p:txBody>
@@ -16872,6 +16873,433 @@
               <a:rPr lang="en-US" smtClean="0"/>
               <a:pPr/>
               <a:t>13</a:t>
+            </a:fld>
+            <a:endParaRPr lang="en-US" dirty="0"/>
+          </a:p>
+        </p:txBody>
+      </p:sp>
+      <p:sp>
+        <p:nvSpPr>
+          <p:cNvPr id="10" name="TextBox 9">
+            <a:extLst>
+              <a:ext uri="{FF2B5EF4-FFF2-40B4-BE49-F238E27FC236}">
+                <a16:creationId xmlns:a16="http://schemas.microsoft.com/office/drawing/2014/main" id="{405B421A-02F4-2CC4-FF3F-D83CFCC804D2}"/>
+              </a:ext>
+            </a:extLst>
+          </p:cNvPr>
+          <p:cNvSpPr txBox="1"/>
+          <p:nvPr/>
+        </p:nvSpPr>
+        <p:spPr>
+          <a:xfrm>
+            <a:off x="328375" y="1391814"/>
+            <a:ext cx="11661509" cy="4062651"/>
+          </a:xfrm>
+          <a:prstGeom prst="rect">
+            <a:avLst/>
+          </a:prstGeom>
+          <a:noFill/>
+        </p:spPr>
+        <p:txBody>
+          <a:bodyPr wrap="square" rtlCol="0">
+            <a:spAutoFit/>
+          </a:bodyPr>
+          <a:lstStyle/>
+          <a:p>
+            <a:r>
+              <a:rPr lang="en-US" sz="1800" dirty="0">
+                <a:solidFill>
+                  <a:srgbClr val="000000"/>
+                </a:solidFill>
+                <a:latin typeface="Cascadia Mono" panose="020B0609020000020004" pitchFamily="49" charset="0"/>
+              </a:rPr>
+              <a:t>@</a:t>
+            </a:r>
+            <a:r>
+              <a:rPr lang="en-US" sz="1800" dirty="0">
+                <a:solidFill>
+                  <a:srgbClr val="2B91AF"/>
+                </a:solidFill>
+                <a:latin typeface="Cascadia Mono" panose="020B0609020000020004" pitchFamily="49" charset="0"/>
+              </a:rPr>
+              <a:t>Component</a:t>
+            </a:r>
+            <a:r>
+              <a:rPr lang="en-US" sz="1800" dirty="0">
+                <a:solidFill>
+                  <a:srgbClr val="000000"/>
+                </a:solidFill>
+                <a:latin typeface="Cascadia Mono" panose="020B0609020000020004" pitchFamily="49" charset="0"/>
+              </a:rPr>
+              <a:t>({</a:t>
+            </a:r>
+          </a:p>
+          <a:p>
+            <a:r>
+              <a:rPr lang="en-US" sz="1800" dirty="0">
+                <a:solidFill>
+                  <a:srgbClr val="000000"/>
+                </a:solidFill>
+                <a:latin typeface="Cascadia Mono" panose="020B0609020000020004" pitchFamily="49" charset="0"/>
+              </a:rPr>
+              <a:t>  selector: </a:t>
+            </a:r>
+            <a:r>
+              <a:rPr lang="en-US" sz="1800" dirty="0">
+                <a:solidFill>
+                  <a:srgbClr val="A31515"/>
+                </a:solidFill>
+                <a:latin typeface="Cascadia Mono" panose="020B0609020000020004" pitchFamily="49" charset="0"/>
+              </a:rPr>
+              <a:t>'app-root’</a:t>
+            </a:r>
+            <a:r>
+              <a:rPr lang="en-US" sz="1800" dirty="0">
+                <a:solidFill>
+                  <a:srgbClr val="000000"/>
+                </a:solidFill>
+                <a:latin typeface="Cascadia Mono" panose="020B0609020000020004" pitchFamily="49" charset="0"/>
+              </a:rPr>
+              <a:t>,</a:t>
+            </a:r>
+          </a:p>
+          <a:p>
+            <a:r>
+              <a:rPr lang="en-US" sz="1800" dirty="0">
+                <a:solidFill>
+                  <a:srgbClr val="000000"/>
+                </a:solidFill>
+                <a:latin typeface="Cascadia Mono" panose="020B0609020000020004" pitchFamily="49" charset="0"/>
+              </a:rPr>
+              <a:t>  </a:t>
+            </a:r>
+            <a:r>
+              <a:rPr lang="en-US" sz="1800" dirty="0" err="1">
+                <a:solidFill>
+                  <a:srgbClr val="000000"/>
+                </a:solidFill>
+                <a:latin typeface="Cascadia Mono" panose="020B0609020000020004" pitchFamily="49" charset="0"/>
+              </a:rPr>
+              <a:t>templateUrl</a:t>
+            </a:r>
+            <a:r>
+              <a:rPr lang="en-US" sz="1800" dirty="0">
+                <a:solidFill>
+                  <a:srgbClr val="000000"/>
+                </a:solidFill>
+                <a:latin typeface="Cascadia Mono" panose="020B0609020000020004" pitchFamily="49" charset="0"/>
+              </a:rPr>
+              <a:t>: </a:t>
+            </a:r>
+            <a:r>
+              <a:rPr lang="en-US" sz="1800" dirty="0">
+                <a:solidFill>
+                  <a:srgbClr val="A31515"/>
+                </a:solidFill>
+                <a:latin typeface="Cascadia Mono" panose="020B0609020000020004" pitchFamily="49" charset="0"/>
+              </a:rPr>
+              <a:t>'./app.component.html'</a:t>
+            </a:r>
+            <a:r>
+              <a:rPr lang="en-US" sz="1800" dirty="0">
+                <a:solidFill>
+                  <a:srgbClr val="000000"/>
+                </a:solidFill>
+                <a:latin typeface="Cascadia Mono" panose="020B0609020000020004" pitchFamily="49" charset="0"/>
+              </a:rPr>
+              <a:t>,</a:t>
+            </a:r>
+          </a:p>
+          <a:p>
+            <a:r>
+              <a:rPr lang="en-US" sz="1800" dirty="0">
+                <a:solidFill>
+                  <a:srgbClr val="000000"/>
+                </a:solidFill>
+                <a:latin typeface="Cascadia Mono" panose="020B0609020000020004" pitchFamily="49" charset="0"/>
+              </a:rPr>
+              <a:t>  </a:t>
+            </a:r>
+            <a:r>
+              <a:rPr lang="en-US" sz="1800" dirty="0" err="1">
+                <a:solidFill>
+                  <a:srgbClr val="000000"/>
+                </a:solidFill>
+                <a:latin typeface="Cascadia Mono" panose="020B0609020000020004" pitchFamily="49" charset="0"/>
+              </a:rPr>
+              <a:t>styleUrl</a:t>
+            </a:r>
+            <a:r>
+              <a:rPr lang="en-US" sz="1800" dirty="0">
+                <a:solidFill>
+                  <a:srgbClr val="000000"/>
+                </a:solidFill>
+                <a:latin typeface="Cascadia Mono" panose="020B0609020000020004" pitchFamily="49" charset="0"/>
+              </a:rPr>
+              <a:t>: </a:t>
+            </a:r>
+            <a:r>
+              <a:rPr lang="en-US" sz="1800" dirty="0">
+                <a:solidFill>
+                  <a:srgbClr val="A31515"/>
+                </a:solidFill>
+                <a:latin typeface="Cascadia Mono" panose="020B0609020000020004" pitchFamily="49" charset="0"/>
+              </a:rPr>
+              <a:t>[‘./app.component.css’]</a:t>
+            </a:r>
+            <a:endParaRPr lang="en-US" sz="1800" dirty="0">
+              <a:solidFill>
+                <a:srgbClr val="000000"/>
+              </a:solidFill>
+              <a:latin typeface="Cascadia Mono" panose="020B0609020000020004" pitchFamily="49" charset="0"/>
+            </a:endParaRPr>
+          </a:p>
+          <a:p>
+            <a:r>
+              <a:rPr lang="en-US" sz="1800" dirty="0">
+                <a:solidFill>
+                  <a:srgbClr val="000000"/>
+                </a:solidFill>
+                <a:latin typeface="Cascadia Mono" panose="020B0609020000020004" pitchFamily="49" charset="0"/>
+              </a:rPr>
+              <a:t>}</a:t>
+            </a:r>
+            <a:endParaRPr lang="en-US" sz="2400" dirty="0">
+              <a:solidFill>
+                <a:srgbClr val="000000"/>
+              </a:solidFill>
+              <a:latin typeface="Cascadia Mono" panose="020B0609020000020004" pitchFamily="49" charset="0"/>
+            </a:endParaRPr>
+          </a:p>
+          <a:p>
+            <a:endParaRPr lang="en-US" sz="2400" dirty="0">
+              <a:solidFill>
+                <a:srgbClr val="000000"/>
+              </a:solidFill>
+            </a:endParaRPr>
+          </a:p>
+          <a:p>
+            <a:pPr marL="285750" indent="-285750">
+              <a:buFont typeface="Wingdings" panose="05000000000000000000" pitchFamily="2" charset="2"/>
+              <a:buChar char="q"/>
+            </a:pPr>
+            <a:r>
+              <a:rPr lang="en-US" sz="2400" dirty="0">
+                <a:solidFill>
+                  <a:srgbClr val="000000"/>
+                </a:solidFill>
+              </a:rPr>
+              <a:t>Selector: Tell Angular where to </a:t>
+            </a:r>
+            <a:r>
+              <a:rPr lang="en-US" sz="2400" b="1" u="sng" dirty="0">
+                <a:solidFill>
+                  <a:srgbClr val="000000"/>
+                </a:solidFill>
+              </a:rPr>
+              <a:t>create and insert</a:t>
+            </a:r>
+            <a:r>
+              <a:rPr lang="en-US" sz="2400" dirty="0">
+                <a:solidFill>
+                  <a:srgbClr val="000000"/>
+                </a:solidFill>
+              </a:rPr>
+              <a:t> this component  in the template HTML tag </a:t>
+            </a:r>
+            <a:r>
+              <a:rPr lang="en-US" sz="2400" dirty="0" err="1">
+                <a:solidFill>
+                  <a:srgbClr val="000000"/>
+                </a:solidFill>
+              </a:rPr>
+              <a:t>e.g</a:t>
+            </a:r>
+            <a:r>
+              <a:rPr lang="en-US" sz="2400" dirty="0">
+                <a:solidFill>
+                  <a:srgbClr val="000000"/>
+                </a:solidFill>
+              </a:rPr>
+              <a:t>: Insert this component between &lt;app-root&gt; tag</a:t>
+            </a:r>
+            <a:br>
+              <a:rPr lang="en-US" sz="2400" dirty="0">
+                <a:solidFill>
+                  <a:srgbClr val="000000"/>
+                </a:solidFill>
+              </a:rPr>
+            </a:br>
+            <a:endParaRPr lang="en-US" sz="2400" dirty="0">
+              <a:solidFill>
+                <a:srgbClr val="000000"/>
+              </a:solidFill>
+            </a:endParaRPr>
+          </a:p>
+          <a:p>
+            <a:pPr marL="285750" indent="-285750">
+              <a:buFont typeface="Wingdings" panose="05000000000000000000" pitchFamily="2" charset="2"/>
+              <a:buChar char="q"/>
+            </a:pPr>
+            <a:r>
+              <a:rPr lang="en-US" sz="2400" dirty="0" err="1">
+                <a:solidFill>
+                  <a:srgbClr val="000000"/>
+                </a:solidFill>
+              </a:rPr>
+              <a:t>templateUrl</a:t>
+            </a:r>
+            <a:r>
+              <a:rPr lang="en-US" sz="2400" dirty="0">
+                <a:solidFill>
+                  <a:srgbClr val="000000"/>
+                </a:solidFill>
+              </a:rPr>
+              <a:t>: Defines HTML template file which is used by this component</a:t>
+            </a:r>
+            <a:br>
+              <a:rPr lang="en-US" sz="2400" dirty="0">
+                <a:solidFill>
+                  <a:srgbClr val="000000"/>
+                </a:solidFill>
+              </a:rPr>
+            </a:br>
+            <a:endParaRPr lang="en-US" sz="2400" dirty="0">
+              <a:solidFill>
+                <a:srgbClr val="000000"/>
+              </a:solidFill>
+            </a:endParaRPr>
+          </a:p>
+          <a:p>
+            <a:pPr marL="285750" indent="-285750">
+              <a:buFont typeface="Wingdings" panose="05000000000000000000" pitchFamily="2" charset="2"/>
+              <a:buChar char="q"/>
+            </a:pPr>
+            <a:r>
+              <a:rPr lang="en-US" sz="2400" dirty="0" err="1">
+                <a:solidFill>
+                  <a:srgbClr val="000000"/>
+                </a:solidFill>
+              </a:rPr>
+              <a:t>styleUrl</a:t>
+            </a:r>
+            <a:r>
+              <a:rPr lang="en-US" sz="2400" dirty="0">
+                <a:solidFill>
+                  <a:srgbClr val="000000"/>
+                </a:solidFill>
+              </a:rPr>
+              <a:t>: Defines Style format file(s) which is used by this component</a:t>
+            </a:r>
+          </a:p>
+        </p:txBody>
+      </p:sp>
+    </p:spTree>
+    <p:extLst>
+      <p:ext uri="{BB962C8B-B14F-4D97-AF65-F5344CB8AC3E}">
+        <p14:creationId xmlns:p14="http://schemas.microsoft.com/office/powerpoint/2010/main" val="4268193180"/>
+      </p:ext>
+    </p:extLst>
+  </p:cSld>
+  <p:clrMapOvr>
+    <a:masterClrMapping/>
+  </p:clrMapOvr>
+</p:sld>
+</file>
+
+<file path=ppt/slides/slide14.xml><?xml version="1.0" encoding="utf-8"?>
+<p:sld xmlns:a="http://schemas.openxmlformats.org/drawingml/2006/main" xmlns:r="http://schemas.openxmlformats.org/officeDocument/2006/relationships" xmlns:p="http://schemas.openxmlformats.org/presentationml/2006/main">
+  <p:cSld>
+    <p:spTree>
+      <p:nvGrpSpPr>
+        <p:cNvPr id="1" name=""/>
+        <p:cNvGrpSpPr/>
+        <p:nvPr/>
+      </p:nvGrpSpPr>
+      <p:grpSpPr>
+        <a:xfrm>
+          <a:off x="0" y="0"/>
+          <a:ext cx="0" cy="0"/>
+          <a:chOff x="0" y="0"/>
+          <a:chExt cx="0" cy="0"/>
+        </a:xfrm>
+      </p:grpSpPr>
+      <p:sp>
+        <p:nvSpPr>
+          <p:cNvPr id="2" name="Title 1">
+            <a:extLst>
+              <a:ext uri="{FF2B5EF4-FFF2-40B4-BE49-F238E27FC236}">
+                <a16:creationId xmlns:a16="http://schemas.microsoft.com/office/drawing/2014/main" id="{85D263CF-A796-7EAD-540C-EB09D06BA351}"/>
+              </a:ext>
+            </a:extLst>
+          </p:cNvPr>
+          <p:cNvSpPr>
+            <a:spLocks noGrp="1"/>
+          </p:cNvSpPr>
+          <p:nvPr>
+            <p:ph type="title"/>
+          </p:nvPr>
+        </p:nvSpPr>
+        <p:spPr>
+          <a:xfrm>
+            <a:off x="291547" y="187537"/>
+            <a:ext cx="11403495" cy="821206"/>
+          </a:xfrm>
+        </p:spPr>
+        <p:txBody>
+          <a:bodyPr>
+            <a:normAutofit fontScale="90000"/>
+          </a:bodyPr>
+          <a:lstStyle/>
+          <a:p>
+            <a:pPr algn="ctr"/>
+            <a:r>
+              <a:rPr lang="en-US" sz="3200" dirty="0"/>
+              <a:t>Directives</a:t>
+            </a:r>
+            <a:br>
+              <a:rPr lang="en-US" sz="3200" dirty="0"/>
+            </a:br>
+            <a:r>
+              <a:rPr lang="en-US" sz="3200" dirty="0"/>
+              <a:t>Structural Directives - *</a:t>
+            </a:r>
+            <a:r>
+              <a:rPr lang="en-US" sz="3200" dirty="0" err="1"/>
+              <a:t>ngIf</a:t>
+            </a:r>
+            <a:r>
+              <a:rPr lang="en-US" sz="3200" dirty="0"/>
+              <a:t> or @if</a:t>
+            </a:r>
+          </a:p>
+        </p:txBody>
+      </p:sp>
+      <p:sp>
+        <p:nvSpPr>
+          <p:cNvPr id="7" name="Slide Number Placeholder 6">
+            <a:extLst>
+              <a:ext uri="{FF2B5EF4-FFF2-40B4-BE49-F238E27FC236}">
+                <a16:creationId xmlns:a16="http://schemas.microsoft.com/office/drawing/2014/main" id="{EFEF5E5D-61DE-8FE4-6915-D64316034217}"/>
+              </a:ext>
+            </a:extLst>
+          </p:cNvPr>
+          <p:cNvSpPr>
+            <a:spLocks noGrp="1"/>
+          </p:cNvSpPr>
+          <p:nvPr>
+            <p:ph type="sldNum" sz="quarter" idx="12"/>
+          </p:nvPr>
+        </p:nvSpPr>
+        <p:spPr/>
+        <p:txBody>
+          <a:bodyPr/>
+          <a:lstStyle/>
+          <a:p>
+            <a:fld id="{11A71338-8BA2-4C79-A6C5-5A8E30081D0C}" type="slidenum">
+              <a:rPr lang="en-US" smtClean="0"/>
+              <a:pPr/>
+              <a:t>14</a:t>
             </a:fld>
             <a:endParaRPr lang="en-US" dirty="0"/>
           </a:p>
@@ -17826,7 +18254,7 @@
 </p:sld>
 </file>
 
-<file path=ppt/slides/slide14.xml><?xml version="1.0" encoding="utf-8"?>
+<file path=ppt/slides/slide15.xml><?xml version="1.0" encoding="utf-8"?>
 <p:sld xmlns:a="http://schemas.openxmlformats.org/drawingml/2006/main" xmlns:r="http://schemas.openxmlformats.org/officeDocument/2006/relationships" xmlns:p="http://schemas.openxmlformats.org/presentationml/2006/main">
   <p:cSld>
     <p:spTree>
@@ -17918,7 +18346,7 @@
             <a:fld id="{11A71338-8BA2-4C79-A6C5-5A8E30081D0C}" type="slidenum">
               <a:rPr lang="en-US" smtClean="0"/>
               <a:pPr/>
-              <a:t>14</a:t>
+              <a:t>15</a:t>
             </a:fld>
             <a:endParaRPr lang="en-US" dirty="0"/>
           </a:p>
@@ -19131,7 +19559,7 @@
 </p:sld>
 </file>
 
-<file path=ppt/slides/slide15.xml><?xml version="1.0" encoding="utf-8"?>
+<file path=ppt/slides/slide16.xml><?xml version="1.0" encoding="utf-8"?>
 <p:sld xmlns:a="http://schemas.openxmlformats.org/drawingml/2006/main" xmlns:r="http://schemas.openxmlformats.org/officeDocument/2006/relationships" xmlns:p="http://schemas.openxmlformats.org/presentationml/2006/main">
   <p:cSld>
     <p:spTree>
@@ -19220,7 +19648,7 @@
             <a:fld id="{11A71338-8BA2-4C79-A6C5-5A8E30081D0C}" type="slidenum">
               <a:rPr lang="en-US" smtClean="0"/>
               <a:pPr/>
-              <a:t>15</a:t>
+              <a:t>16</a:t>
             </a:fld>
             <a:endParaRPr lang="en-US" dirty="0"/>
           </a:p>
@@ -20043,7 +20471,7 @@
 </p:sld>
 </file>
 
-<file path=ppt/slides/slide16.xml><?xml version="1.0" encoding="utf-8"?>
+<file path=ppt/slides/slide17.xml><?xml version="1.0" encoding="utf-8"?>
 <p:sld xmlns:a="http://schemas.openxmlformats.org/drawingml/2006/main" xmlns:r="http://schemas.openxmlformats.org/officeDocument/2006/relationships" xmlns:p="http://schemas.openxmlformats.org/presentationml/2006/main">
   <p:cSld>
     <p:spTree>
@@ -20132,7 +20560,7 @@
             <a:fld id="{11A71338-8BA2-4C79-A6C5-5A8E30081D0C}" type="slidenum">
               <a:rPr lang="en-US" smtClean="0"/>
               <a:pPr/>
-              <a:t>16</a:t>
+              <a:t>17</a:t>
             </a:fld>
             <a:endParaRPr lang="en-US" dirty="0"/>
           </a:p>
@@ -20996,7 +21424,7 @@
 </p:sld>
 </file>
 
-<file path=ppt/slides/slide17.xml><?xml version="1.0" encoding="utf-8"?>
+<file path=ppt/slides/slide18.xml><?xml version="1.0" encoding="utf-8"?>
 <p:sld xmlns:a="http://schemas.openxmlformats.org/drawingml/2006/main" xmlns:r="http://schemas.openxmlformats.org/officeDocument/2006/relationships" xmlns:p="http://schemas.openxmlformats.org/presentationml/2006/main">
   <p:cSld>
     <p:spTree>
@@ -21080,7 +21508,7 @@
             <a:fld id="{11A71338-8BA2-4C79-A6C5-5A8E30081D0C}" type="slidenum">
               <a:rPr lang="en-US" smtClean="0"/>
               <a:pPr/>
-              <a:t>17</a:t>
+              <a:t>18</a:t>
             </a:fld>
             <a:endParaRPr lang="en-US" dirty="0"/>
           </a:p>
@@ -21395,7 +21823,7 @@
 </p:sld>
 </file>
 
-<file path=ppt/slides/slide18.xml><?xml version="1.0" encoding="utf-8"?>
+<file path=ppt/slides/slide19.xml><?xml version="1.0" encoding="utf-8"?>
 <p:sld xmlns:a="http://schemas.openxmlformats.org/drawingml/2006/main" xmlns:r="http://schemas.openxmlformats.org/officeDocument/2006/relationships" xmlns:p="http://schemas.openxmlformats.org/presentationml/2006/main">
   <p:cSld>
     <p:spTree>
@@ -21527,7 +21955,7 @@
             <a:fld id="{11A71338-8BA2-4C79-A6C5-5A8E30081D0C}" type="slidenum">
               <a:rPr lang="en-US" smtClean="0"/>
               <a:pPr/>
-              <a:t>18</a:t>
+              <a:t>19</a:t>
             </a:fld>
             <a:endParaRPr lang="en-US" dirty="0"/>
           </a:p>
@@ -21672,9 +22100,24 @@
         </p:spPr>
         <p:txBody>
           <a:bodyPr>
-            <a:normAutofit/>
+            <a:normAutofit lnSpcReduction="10000"/>
           </a:bodyPr>
           <a:lstStyle/>
+          <a:p>
+            <a:pPr marL="342900" indent="-342900">
+              <a:buFont typeface="Wingdings" panose="05000000000000000000" pitchFamily="2" charset="2"/>
+              <a:buChar char="v"/>
+            </a:pPr>
+            <a:r>
+              <a:rPr lang="en-US" dirty="0"/>
+              <a:t>Web Development Study </a:t>
+            </a:r>
+            <a:r>
+              <a:rPr lang="en-US" dirty="0" err="1"/>
+              <a:t>github</a:t>
+            </a:r>
+            <a:endParaRPr lang="en-US" dirty="0"/>
+          </a:p>
           <a:p>
             <a:pPr marL="342900" indent="-342900">
               <a:buFont typeface="Wingdings" panose="05000000000000000000" pitchFamily="2" charset="2"/>
@@ -21847,8 +22290,12 @@
           <a:p>
             <a:pPr algn="ctr"/>
             <a:r>
-              <a:rPr lang="en-US" dirty="0"/>
-              <a:t>Data Binding</a:t>
+              <a:rPr lang="en-US" sz="3100" dirty="0"/>
+              <a:t>Web Development Study </a:t>
+            </a:r>
+            <a:r>
+              <a:rPr lang="en-US" sz="3100" dirty="0" err="1"/>
+              <a:t>github</a:t>
             </a:r>
             <a:endParaRPr lang="en-US" sz="3100" dirty="0"/>
           </a:p>
@@ -21879,6 +22326,180 @@
               <a:rPr lang="en-US" smtClean="0"/>
               <a:pPr/>
               <a:t>3</a:t>
+            </a:fld>
+            <a:endParaRPr lang="en-US" dirty="0"/>
+          </a:p>
+        </p:txBody>
+      </p:sp>
+      <p:pic>
+        <p:nvPicPr>
+          <p:cNvPr id="10" name="Picture 9">
+            <a:extLst>
+              <a:ext uri="{FF2B5EF4-FFF2-40B4-BE49-F238E27FC236}">
+                <a16:creationId xmlns:a16="http://schemas.microsoft.com/office/drawing/2014/main" id="{CCDB4F56-785A-4D41-2251-224DB95CD1F3}"/>
+              </a:ext>
+            </a:extLst>
+          </p:cNvPr>
+          <p:cNvPicPr>
+            <a:picLocks noChangeAspect="1"/>
+          </p:cNvPicPr>
+          <p:nvPr/>
+        </p:nvPicPr>
+        <p:blipFill>
+          <a:blip r:embed="rId2"/>
+          <a:stretch>
+            <a:fillRect/>
+          </a:stretch>
+        </p:blipFill>
+        <p:spPr>
+          <a:xfrm>
+            <a:off x="418000" y="1734456"/>
+            <a:ext cx="11355999" cy="4826001"/>
+          </a:xfrm>
+          <a:prstGeom prst="rect">
+            <a:avLst/>
+          </a:prstGeom>
+        </p:spPr>
+      </p:pic>
+      <p:sp>
+        <p:nvSpPr>
+          <p:cNvPr id="11" name="Oval 10">
+            <a:extLst>
+              <a:ext uri="{FF2B5EF4-FFF2-40B4-BE49-F238E27FC236}">
+                <a16:creationId xmlns:a16="http://schemas.microsoft.com/office/drawing/2014/main" id="{3A5CB2D3-F5CF-8D26-FB97-3E3FF9D4B1D2}"/>
+              </a:ext>
+            </a:extLst>
+          </p:cNvPr>
+          <p:cNvSpPr/>
+          <p:nvPr/>
+        </p:nvSpPr>
+        <p:spPr>
+          <a:xfrm>
+            <a:off x="1219200" y="1618343"/>
+            <a:ext cx="3294743" cy="682171"/>
+          </a:xfrm>
+          <a:prstGeom prst="ellipse">
+            <a:avLst/>
+          </a:prstGeom>
+          <a:noFill/>
+        </p:spPr>
+        <p:style>
+          <a:lnRef idx="2">
+            <a:schemeClr val="accent1">
+              <a:shade val="15000"/>
+            </a:schemeClr>
+          </a:lnRef>
+          <a:fillRef idx="1">
+            <a:schemeClr val="accent1"/>
+          </a:fillRef>
+          <a:effectRef idx="0">
+            <a:schemeClr val="accent1"/>
+          </a:effectRef>
+          <a:fontRef idx="minor">
+            <a:schemeClr val="lt1"/>
+          </a:fontRef>
+        </p:style>
+        <p:txBody>
+          <a:bodyPr rtlCol="0" anchor="ctr"/>
+          <a:lstStyle/>
+          <a:p>
+            <a:pPr algn="ctr"/>
+            <a:endParaRPr lang="en-US"/>
+          </a:p>
+        </p:txBody>
+      </p:sp>
+    </p:spTree>
+    <p:extLst>
+      <p:ext uri="{BB962C8B-B14F-4D97-AF65-F5344CB8AC3E}">
+        <p14:creationId xmlns:p14="http://schemas.microsoft.com/office/powerpoint/2010/main" val="3745977453"/>
+      </p:ext>
+    </p:extLst>
+  </p:cSld>
+  <p:clrMapOvr>
+    <a:masterClrMapping/>
+  </p:clrMapOvr>
+</p:sld>
+</file>
+
+<file path=ppt/slides/slide4.xml><?xml version="1.0" encoding="utf-8"?>
+<p:sld xmlns:a="http://schemas.openxmlformats.org/drawingml/2006/main" xmlns:r="http://schemas.openxmlformats.org/officeDocument/2006/relationships" xmlns:p="http://schemas.openxmlformats.org/presentationml/2006/main">
+  <p:cSld>
+    <p:spTree>
+      <p:nvGrpSpPr>
+        <p:cNvPr id="1" name=""/>
+        <p:cNvGrpSpPr/>
+        <p:nvPr/>
+      </p:nvGrpSpPr>
+      <p:grpSpPr>
+        <a:xfrm>
+          <a:off x="0" y="0"/>
+          <a:ext cx="0" cy="0"/>
+          <a:chOff x="0" y="0"/>
+          <a:chExt cx="0" cy="0"/>
+        </a:xfrm>
+      </p:grpSpPr>
+      <p:sp>
+        <p:nvSpPr>
+          <p:cNvPr id="2" name="Title 1">
+            <a:extLst>
+              <a:ext uri="{FF2B5EF4-FFF2-40B4-BE49-F238E27FC236}">
+                <a16:creationId xmlns:a16="http://schemas.microsoft.com/office/drawing/2014/main" id="{85D263CF-A796-7EAD-540C-EB09D06BA351}"/>
+              </a:ext>
+            </a:extLst>
+          </p:cNvPr>
+          <p:cNvSpPr>
+            <a:spLocks noGrp="1"/>
+          </p:cNvSpPr>
+          <p:nvPr>
+            <p:ph type="title"/>
+          </p:nvPr>
+        </p:nvSpPr>
+        <p:spPr>
+          <a:xfrm>
+            <a:off x="291547" y="187537"/>
+            <a:ext cx="11403495" cy="908686"/>
+          </a:xfrm>
+        </p:spPr>
+        <p:txBody>
+          <a:bodyPr>
+            <a:normAutofit/>
+          </a:bodyPr>
+          <a:lstStyle/>
+          <a:p>
+            <a:pPr algn="ctr"/>
+            <a:r>
+              <a:rPr lang="en-US" dirty="0"/>
+              <a:t>Data Binding</a:t>
+            </a:r>
+            <a:endParaRPr lang="en-US" sz="3100" dirty="0"/>
+          </a:p>
+        </p:txBody>
+      </p:sp>
+      <p:sp>
+        <p:nvSpPr>
+          <p:cNvPr id="7" name="Slide Number Placeholder 6">
+            <a:extLst>
+              <a:ext uri="{FF2B5EF4-FFF2-40B4-BE49-F238E27FC236}">
+                <a16:creationId xmlns:a16="http://schemas.microsoft.com/office/drawing/2014/main" id="{EFEF5E5D-61DE-8FE4-6915-D64316034217}"/>
+              </a:ext>
+            </a:extLst>
+          </p:cNvPr>
+          <p:cNvSpPr>
+            <a:spLocks noGrp="1"/>
+          </p:cNvSpPr>
+          <p:nvPr>
+            <p:ph type="sldNum" sz="quarter" idx="12"/>
+          </p:nvPr>
+        </p:nvSpPr>
+        <p:spPr/>
+        <p:txBody>
+          <a:bodyPr/>
+          <a:lstStyle/>
+          <a:p>
+            <a:fld id="{11A71338-8BA2-4C79-A6C5-5A8E30081D0C}" type="slidenum">
+              <a:rPr lang="en-US" smtClean="0"/>
+              <a:pPr/>
+              <a:t>4</a:t>
             </a:fld>
             <a:endParaRPr lang="en-US" dirty="0"/>
           </a:p>
@@ -22002,7 +22623,7 @@
     </p:spTree>
     <p:extLst>
       <p:ext uri="{BB962C8B-B14F-4D97-AF65-F5344CB8AC3E}">
-        <p14:creationId xmlns:p14="http://schemas.microsoft.com/office/powerpoint/2010/main" val="3745977453"/>
+        <p14:creationId xmlns:p14="http://schemas.microsoft.com/office/powerpoint/2010/main" val="4070493236"/>
       </p:ext>
     </p:extLst>
   </p:cSld>
@@ -22012,7 +22633,7 @@
 </p:sld>
 </file>
 
-<file path=ppt/slides/slide4.xml><?xml version="1.0" encoding="utf-8"?>
+<file path=ppt/slides/slide5.xml><?xml version="1.0" encoding="utf-8"?>
 <p:sld xmlns:a="http://schemas.openxmlformats.org/drawingml/2006/main" xmlns:r="http://schemas.openxmlformats.org/officeDocument/2006/relationships" xmlns:p="http://schemas.openxmlformats.org/presentationml/2006/main">
   <p:cSld>
     <p:spTree>
@@ -22136,7 +22757,7 @@
             <a:fld id="{11A71338-8BA2-4C79-A6C5-5A8E30081D0C}" type="slidenum">
               <a:rPr lang="en-US" smtClean="0"/>
               <a:pPr/>
-              <a:t>4</a:t>
+              <a:t>5</a:t>
             </a:fld>
             <a:endParaRPr lang="en-US" dirty="0"/>
           </a:p>
@@ -22782,7 +23403,7 @@
 </p:sld>
 </file>
 
-<file path=ppt/slides/slide5.xml><?xml version="1.0" encoding="utf-8"?>
+<file path=ppt/slides/slide6.xml><?xml version="1.0" encoding="utf-8"?>
 <p:sld xmlns:a="http://schemas.openxmlformats.org/drawingml/2006/main" xmlns:r="http://schemas.openxmlformats.org/officeDocument/2006/relationships" xmlns:p="http://schemas.openxmlformats.org/presentationml/2006/main">
   <p:cSld>
     <p:spTree>
@@ -22875,7 +23496,7 @@
             <a:fld id="{11A71338-8BA2-4C79-A6C5-5A8E30081D0C}" type="slidenum">
               <a:rPr lang="en-US" smtClean="0"/>
               <a:pPr/>
-              <a:t>5</a:t>
+              <a:t>6</a:t>
             </a:fld>
             <a:endParaRPr lang="en-US" dirty="0"/>
           </a:p>
@@ -23712,7 +24333,7 @@
 </p:sld>
 </file>
 
-<file path=ppt/slides/slide6.xml><?xml version="1.0" encoding="utf-8"?>
+<file path=ppt/slides/slide7.xml><?xml version="1.0" encoding="utf-8"?>
 <p:sld xmlns:a="http://schemas.openxmlformats.org/drawingml/2006/main" xmlns:r="http://schemas.openxmlformats.org/officeDocument/2006/relationships" xmlns:p="http://schemas.openxmlformats.org/presentationml/2006/main">
   <p:cSld>
     <p:spTree>
@@ -23790,7 +24411,7 @@
             <a:fld id="{11A71338-8BA2-4C79-A6C5-5A8E30081D0C}" type="slidenum">
               <a:rPr lang="en-US" smtClean="0"/>
               <a:pPr/>
-              <a:t>6</a:t>
+              <a:t>7</a:t>
             </a:fld>
             <a:endParaRPr lang="en-US" dirty="0"/>
           </a:p>
@@ -23922,7 +24543,7 @@
 </p:sld>
 </file>
 
-<file path=ppt/slides/slide7.xml><?xml version="1.0" encoding="utf-8"?>
+<file path=ppt/slides/slide8.xml><?xml version="1.0" encoding="utf-8"?>
 <p:sld xmlns:a="http://schemas.openxmlformats.org/drawingml/2006/main" xmlns:r="http://schemas.openxmlformats.org/officeDocument/2006/relationships" xmlns:p="http://schemas.openxmlformats.org/presentationml/2006/main">
   <p:cSld>
     <p:spTree>
@@ -24007,7 +24628,7 @@
             <a:fld id="{11A71338-8BA2-4C79-A6C5-5A8E30081D0C}" type="slidenum">
               <a:rPr lang="en-US" smtClean="0"/>
               <a:pPr/>
-              <a:t>7</a:t>
+              <a:t>8</a:t>
             </a:fld>
             <a:endParaRPr lang="en-US" dirty="0"/>
           </a:p>
@@ -24607,7 +25228,7 @@
 </p:sld>
 </file>
 
-<file path=ppt/slides/slide8.xml><?xml version="1.0" encoding="utf-8"?>
+<file path=ppt/slides/slide9.xml><?xml version="1.0" encoding="utf-8"?>
 <p:sld xmlns:a="http://schemas.openxmlformats.org/drawingml/2006/main" xmlns:r="http://schemas.openxmlformats.org/officeDocument/2006/relationships" xmlns:p="http://schemas.openxmlformats.org/presentationml/2006/main">
   <p:cSld>
     <p:spTree>
@@ -24692,7 +25313,7 @@
             <a:fld id="{11A71338-8BA2-4C79-A6C5-5A8E30081D0C}" type="slidenum">
               <a:rPr lang="en-US" smtClean="0"/>
               <a:pPr/>
-              <a:t>8</a:t>
+              <a:t>9</a:t>
             </a:fld>
             <a:endParaRPr lang="en-US" dirty="0"/>
           </a:p>
@@ -25237,433 +25858,6 @@
     <p:extLst>
       <p:ext uri="{BB962C8B-B14F-4D97-AF65-F5344CB8AC3E}">
         <p14:creationId xmlns:p14="http://schemas.microsoft.com/office/powerpoint/2010/main" val="699992141"/>
-      </p:ext>
-    </p:extLst>
-  </p:cSld>
-  <p:clrMapOvr>
-    <a:masterClrMapping/>
-  </p:clrMapOvr>
-</p:sld>
-</file>
-
-<file path=ppt/slides/slide9.xml><?xml version="1.0" encoding="utf-8"?>
-<p:sld xmlns:a="http://schemas.openxmlformats.org/drawingml/2006/main" xmlns:r="http://schemas.openxmlformats.org/officeDocument/2006/relationships" xmlns:p="http://schemas.openxmlformats.org/presentationml/2006/main">
-  <p:cSld>
-    <p:spTree>
-      <p:nvGrpSpPr>
-        <p:cNvPr id="1" name=""/>
-        <p:cNvGrpSpPr/>
-        <p:nvPr/>
-      </p:nvGrpSpPr>
-      <p:grpSpPr>
-        <a:xfrm>
-          <a:off x="0" y="0"/>
-          <a:ext cx="0" cy="0"/>
-          <a:chOff x="0" y="0"/>
-          <a:chExt cx="0" cy="0"/>
-        </a:xfrm>
-      </p:grpSpPr>
-      <p:sp>
-        <p:nvSpPr>
-          <p:cNvPr id="2" name="Title 1">
-            <a:extLst>
-              <a:ext uri="{FF2B5EF4-FFF2-40B4-BE49-F238E27FC236}">
-                <a16:creationId xmlns:a16="http://schemas.microsoft.com/office/drawing/2014/main" id="{85D263CF-A796-7EAD-540C-EB09D06BA351}"/>
-              </a:ext>
-            </a:extLst>
-          </p:cNvPr>
-          <p:cNvSpPr>
-            <a:spLocks noGrp="1"/>
-          </p:cNvSpPr>
-          <p:nvPr>
-            <p:ph type="title"/>
-          </p:nvPr>
-        </p:nvSpPr>
-        <p:spPr>
-          <a:xfrm>
-            <a:off x="291547" y="187537"/>
-            <a:ext cx="11403495" cy="908686"/>
-          </a:xfrm>
-        </p:spPr>
-        <p:txBody>
-          <a:bodyPr>
-            <a:normAutofit fontScale="90000"/>
-          </a:bodyPr>
-          <a:lstStyle/>
-          <a:p>
-            <a:pPr algn="ctr"/>
-            <a:r>
-              <a:rPr lang="en-US" dirty="0"/>
-              <a:t>Data Binding</a:t>
-            </a:r>
-            <a:br>
-              <a:rPr lang="en-US" dirty="0"/>
-            </a:br>
-            <a:r>
-              <a:rPr lang="en-US" dirty="0"/>
-              <a:t>Attribute vs Property Binding </a:t>
-            </a:r>
-            <a:endParaRPr lang="en-US" sz="3100" dirty="0"/>
-          </a:p>
-        </p:txBody>
-      </p:sp>
-      <p:sp>
-        <p:nvSpPr>
-          <p:cNvPr id="7" name="Slide Number Placeholder 6">
-            <a:extLst>
-              <a:ext uri="{FF2B5EF4-FFF2-40B4-BE49-F238E27FC236}">
-                <a16:creationId xmlns:a16="http://schemas.microsoft.com/office/drawing/2014/main" id="{EFEF5E5D-61DE-8FE4-6915-D64316034217}"/>
-              </a:ext>
-            </a:extLst>
-          </p:cNvPr>
-          <p:cNvSpPr>
-            <a:spLocks noGrp="1"/>
-          </p:cNvSpPr>
-          <p:nvPr>
-            <p:ph type="sldNum" sz="quarter" idx="12"/>
-          </p:nvPr>
-        </p:nvSpPr>
-        <p:spPr/>
-        <p:txBody>
-          <a:bodyPr/>
-          <a:lstStyle/>
-          <a:p>
-            <a:fld id="{11A71338-8BA2-4C79-A6C5-5A8E30081D0C}" type="slidenum">
-              <a:rPr lang="en-US" smtClean="0"/>
-              <a:pPr/>
-              <a:t>9</a:t>
-            </a:fld>
-            <a:endParaRPr lang="en-US" dirty="0"/>
-          </a:p>
-        </p:txBody>
-      </p:sp>
-      <p:sp>
-        <p:nvSpPr>
-          <p:cNvPr id="10" name="TextBox 9">
-            <a:extLst>
-              <a:ext uri="{FF2B5EF4-FFF2-40B4-BE49-F238E27FC236}">
-                <a16:creationId xmlns:a16="http://schemas.microsoft.com/office/drawing/2014/main" id="{405B421A-02F4-2CC4-FF3F-D83CFCC804D2}"/>
-              </a:ext>
-            </a:extLst>
-          </p:cNvPr>
-          <p:cNvSpPr txBox="1"/>
-          <p:nvPr/>
-        </p:nvSpPr>
-        <p:spPr>
-          <a:xfrm>
-            <a:off x="493486" y="1560286"/>
-            <a:ext cx="10805885" cy="3908762"/>
-          </a:xfrm>
-          <a:prstGeom prst="rect">
-            <a:avLst/>
-          </a:prstGeom>
-          <a:noFill/>
-        </p:spPr>
-        <p:txBody>
-          <a:bodyPr wrap="square" rtlCol="0">
-            <a:spAutoFit/>
-          </a:bodyPr>
-          <a:lstStyle/>
-          <a:p>
-            <a:pPr marL="342900" indent="-342900">
-              <a:buFont typeface="Wingdings" panose="05000000000000000000" pitchFamily="2" charset="2"/>
-              <a:buChar char="q"/>
-            </a:pPr>
-            <a:r>
-              <a:rPr lang="en-US" sz="2400" dirty="0"/>
-              <a:t>Attribute binding </a:t>
-            </a:r>
-            <a:r>
-              <a:rPr lang="en-US" sz="2400" b="1" u="sng" dirty="0"/>
-              <a:t>binds HTML attribute</a:t>
-            </a:r>
-            <a:r>
-              <a:rPr lang="en-US" sz="2400" dirty="0"/>
-              <a:t> and is prefix with </a:t>
-            </a:r>
-            <a:r>
-              <a:rPr lang="en-US" sz="2400" dirty="0" err="1"/>
-              <a:t>attr</a:t>
-            </a:r>
-            <a:r>
-              <a:rPr lang="en-US" sz="2400" dirty="0"/>
-              <a:t>. such as</a:t>
-            </a:r>
-            <a:br>
-              <a:rPr lang="en-US" sz="2400" dirty="0"/>
-            </a:br>
-            <a:r>
-              <a:rPr lang="en-US" sz="2400" dirty="0">
-                <a:solidFill>
-                  <a:srgbClr val="0000FF"/>
-                </a:solidFill>
-                <a:latin typeface="Cascadia Mono" panose="020B0609020000020004" pitchFamily="49" charset="0"/>
-              </a:rPr>
-              <a:t>&lt;</a:t>
-            </a:r>
-            <a:r>
-              <a:rPr lang="en-US" sz="2400" dirty="0">
-                <a:solidFill>
-                  <a:srgbClr val="800000"/>
-                </a:solidFill>
-                <a:latin typeface="Cascadia Mono" panose="020B0609020000020004" pitchFamily="49" charset="0"/>
-              </a:rPr>
-              <a:t>button</a:t>
-            </a:r>
-            <a:r>
-              <a:rPr lang="en-US" sz="2400" dirty="0">
-                <a:solidFill>
-                  <a:srgbClr val="000000"/>
-                </a:solidFill>
-                <a:latin typeface="Cascadia Mono" panose="020B0609020000020004" pitchFamily="49" charset="0"/>
-              </a:rPr>
-              <a:t> </a:t>
-            </a:r>
-            <a:r>
-              <a:rPr lang="en-US" sz="2400" dirty="0">
-                <a:solidFill>
-                  <a:srgbClr val="FF0000"/>
-                </a:solidFill>
-                <a:latin typeface="Cascadia Mono" panose="020B0609020000020004" pitchFamily="49" charset="0"/>
-              </a:rPr>
-              <a:t>[</a:t>
-            </a:r>
-            <a:r>
-              <a:rPr lang="en-US" sz="2400" dirty="0" err="1">
-                <a:solidFill>
-                  <a:srgbClr val="FF0000"/>
-                </a:solidFill>
-                <a:latin typeface="Cascadia Mono" panose="020B0609020000020004" pitchFamily="49" charset="0"/>
-              </a:rPr>
-              <a:t>attr.disabled</a:t>
-            </a:r>
-            <a:r>
-              <a:rPr lang="en-US" sz="2400" dirty="0">
-                <a:solidFill>
-                  <a:srgbClr val="FF0000"/>
-                </a:solidFill>
-                <a:latin typeface="Cascadia Mono" panose="020B0609020000020004" pitchFamily="49" charset="0"/>
-              </a:rPr>
-              <a:t>]</a:t>
-            </a:r>
-            <a:r>
-              <a:rPr lang="en-US" sz="2400" dirty="0">
-                <a:solidFill>
-                  <a:srgbClr val="0000FF"/>
-                </a:solidFill>
-                <a:latin typeface="Cascadia Mono" panose="020B0609020000020004" pitchFamily="49" charset="0"/>
-              </a:rPr>
-              <a:t>="</a:t>
-            </a:r>
-            <a:r>
-              <a:rPr lang="en-US" sz="2400" dirty="0" err="1">
-                <a:solidFill>
-                  <a:srgbClr val="0000FF"/>
-                </a:solidFill>
-                <a:latin typeface="Cascadia Mono" panose="020B0609020000020004" pitchFamily="49" charset="0"/>
-              </a:rPr>
-              <a:t>getButtonState</a:t>
-            </a:r>
-            <a:r>
-              <a:rPr lang="en-US" sz="2400" dirty="0">
-                <a:solidFill>
-                  <a:srgbClr val="0000FF"/>
-                </a:solidFill>
-                <a:latin typeface="Cascadia Mono" panose="020B0609020000020004" pitchFamily="49" charset="0"/>
-              </a:rPr>
-              <a:t>()"&gt;&lt;/</a:t>
-            </a:r>
-            <a:r>
-              <a:rPr lang="en-US" sz="2400" dirty="0">
-                <a:solidFill>
-                  <a:srgbClr val="800000"/>
-                </a:solidFill>
-                <a:latin typeface="Cascadia Mono" panose="020B0609020000020004" pitchFamily="49" charset="0"/>
-              </a:rPr>
-              <a:t>button</a:t>
-            </a:r>
-            <a:r>
-              <a:rPr lang="en-US" sz="2400" dirty="0">
-                <a:solidFill>
-                  <a:srgbClr val="0000FF"/>
-                </a:solidFill>
-                <a:latin typeface="Cascadia Mono" panose="020B0609020000020004" pitchFamily="49" charset="0"/>
-              </a:rPr>
-              <a:t>&gt;</a:t>
-            </a:r>
-            <a:endParaRPr lang="en-US" sz="3200" dirty="0"/>
-          </a:p>
-          <a:p>
-            <a:pPr marL="342900" indent="-342900">
-              <a:buFont typeface="Wingdings" panose="05000000000000000000" pitchFamily="2" charset="2"/>
-              <a:buChar char="q"/>
-            </a:pPr>
-            <a:endParaRPr lang="en-US" sz="2400" dirty="0"/>
-          </a:p>
-          <a:p>
-            <a:pPr marL="342900" indent="-342900">
-              <a:buFont typeface="Wingdings" panose="05000000000000000000" pitchFamily="2" charset="2"/>
-              <a:buChar char="q"/>
-            </a:pPr>
-            <a:r>
-              <a:rPr lang="en-US" sz="2400" dirty="0"/>
-              <a:t>Property binding </a:t>
-            </a:r>
-            <a:r>
-              <a:rPr lang="en-US" sz="2400" b="1" u="sng" dirty="0"/>
-              <a:t>binds DOM object property</a:t>
-            </a:r>
-            <a:r>
-              <a:rPr lang="en-US" sz="2400" dirty="0"/>
-              <a:t> such as</a:t>
-            </a:r>
-            <a:br>
-              <a:rPr lang="en-US" sz="2400" dirty="0"/>
-            </a:br>
-            <a:r>
-              <a:rPr lang="en-US" sz="2400" dirty="0">
-                <a:solidFill>
-                  <a:srgbClr val="0000FF"/>
-                </a:solidFill>
-                <a:latin typeface="Cascadia Mono" panose="020B0609020000020004" pitchFamily="49" charset="0"/>
-              </a:rPr>
-              <a:t>&lt;</a:t>
-            </a:r>
-            <a:r>
-              <a:rPr lang="en-US" sz="2400" dirty="0">
-                <a:solidFill>
-                  <a:srgbClr val="800000"/>
-                </a:solidFill>
-                <a:latin typeface="Cascadia Mono" panose="020B0609020000020004" pitchFamily="49" charset="0"/>
-              </a:rPr>
-              <a:t>button</a:t>
-            </a:r>
-            <a:r>
-              <a:rPr lang="en-US" sz="2400" dirty="0">
-                <a:solidFill>
-                  <a:srgbClr val="000000"/>
-                </a:solidFill>
-                <a:latin typeface="Cascadia Mono" panose="020B0609020000020004" pitchFamily="49" charset="0"/>
-              </a:rPr>
-              <a:t> </a:t>
-            </a:r>
-            <a:r>
-              <a:rPr lang="en-US" sz="2400" dirty="0">
-                <a:solidFill>
-                  <a:srgbClr val="FF0000"/>
-                </a:solidFill>
-                <a:latin typeface="Cascadia Mono" panose="020B0609020000020004" pitchFamily="49" charset="0"/>
-              </a:rPr>
-              <a:t>[disabled]</a:t>
-            </a:r>
-            <a:r>
-              <a:rPr lang="en-US" sz="2400" dirty="0">
-                <a:solidFill>
-                  <a:srgbClr val="0000FF"/>
-                </a:solidFill>
-                <a:latin typeface="Cascadia Mono" panose="020B0609020000020004" pitchFamily="49" charset="0"/>
-              </a:rPr>
-              <a:t>="</a:t>
-            </a:r>
-            <a:r>
-              <a:rPr lang="en-US" sz="2400" dirty="0" err="1">
-                <a:solidFill>
-                  <a:srgbClr val="0000FF"/>
-                </a:solidFill>
-                <a:latin typeface="Cascadia Mono" panose="020B0609020000020004" pitchFamily="49" charset="0"/>
-              </a:rPr>
-              <a:t>getButtonState</a:t>
-            </a:r>
-            <a:r>
-              <a:rPr lang="en-US" sz="2400" dirty="0">
-                <a:solidFill>
-                  <a:srgbClr val="0000FF"/>
-                </a:solidFill>
-                <a:latin typeface="Cascadia Mono" panose="020B0609020000020004" pitchFamily="49" charset="0"/>
-              </a:rPr>
-              <a:t>()"&gt;&lt;/</a:t>
-            </a:r>
-            <a:r>
-              <a:rPr lang="en-US" sz="2400" dirty="0">
-                <a:solidFill>
-                  <a:srgbClr val="800000"/>
-                </a:solidFill>
-                <a:latin typeface="Cascadia Mono" panose="020B0609020000020004" pitchFamily="49" charset="0"/>
-              </a:rPr>
-              <a:t>button</a:t>
-            </a:r>
-            <a:r>
-              <a:rPr lang="en-US" sz="2400" dirty="0">
-                <a:solidFill>
-                  <a:srgbClr val="0000FF"/>
-                </a:solidFill>
-                <a:latin typeface="Cascadia Mono" panose="020B0609020000020004" pitchFamily="49" charset="0"/>
-              </a:rPr>
-              <a:t>&gt;</a:t>
-            </a:r>
-            <a:endParaRPr lang="en-US" sz="3200" dirty="0">
-              <a:solidFill>
-                <a:srgbClr val="0000FF"/>
-              </a:solidFill>
-              <a:latin typeface="Cascadia Mono" panose="020B0609020000020004" pitchFamily="49" charset="0"/>
-            </a:endParaRPr>
-          </a:p>
-          <a:p>
-            <a:pPr marL="342900" indent="-342900">
-              <a:buFont typeface="Wingdings" panose="05000000000000000000" pitchFamily="2" charset="2"/>
-              <a:buChar char="q"/>
-            </a:pPr>
-            <a:endParaRPr lang="en-US" sz="3200" dirty="0">
-              <a:solidFill>
-                <a:srgbClr val="0000FF"/>
-              </a:solidFill>
-              <a:latin typeface="Cascadia Mono" panose="020B0609020000020004" pitchFamily="49" charset="0"/>
-            </a:endParaRPr>
-          </a:p>
-          <a:p>
-            <a:pPr marL="342900" indent="-342900">
-              <a:buFont typeface="Wingdings" panose="05000000000000000000" pitchFamily="2" charset="2"/>
-              <a:buChar char="q"/>
-            </a:pPr>
-            <a:r>
-              <a:rPr lang="en-US" sz="2400" dirty="0"/>
-              <a:t>Attribute and Property </a:t>
-            </a:r>
-            <a:r>
-              <a:rPr lang="en-US" sz="2400" b="1" u="sng" dirty="0"/>
-              <a:t>usually but not always</a:t>
-            </a:r>
-            <a:r>
-              <a:rPr lang="en-US" sz="2400" dirty="0"/>
-              <a:t> have the same name such as attribute </a:t>
-            </a:r>
-            <a:r>
-              <a:rPr lang="en-US" sz="2400" dirty="0" err="1"/>
-              <a:t>rowspan</a:t>
-            </a:r>
-            <a:r>
-              <a:rPr lang="en-US" sz="2400" dirty="0"/>
-              <a:t> vs property </a:t>
-            </a:r>
-            <a:r>
-              <a:rPr lang="en-US" sz="2400" dirty="0" err="1"/>
-              <a:t>rowSpan</a:t>
-            </a:r>
-            <a:r>
-              <a:rPr lang="en-US" sz="2400" dirty="0"/>
-              <a:t>. Their semantic/meaning is the same but syntactically is different.</a:t>
-            </a:r>
-            <a:endParaRPr lang="en-US" sz="3200" dirty="0"/>
-          </a:p>
-          <a:p>
-            <a:endParaRPr lang="en-US" sz="2400" dirty="0"/>
-          </a:p>
-        </p:txBody>
-      </p:sp>
-    </p:spTree>
-    <p:extLst>
-      <p:ext uri="{BB962C8B-B14F-4D97-AF65-F5344CB8AC3E}">
-        <p14:creationId xmlns:p14="http://schemas.microsoft.com/office/powerpoint/2010/main" val="3029076899"/>
       </p:ext>
     </p:extLst>
   </p:cSld>
@@ -26507,6 +26701,25 @@
 </file>
 
 <file path=customXml/item1.xml><?xml version="1.0" encoding="utf-8"?>
+<p:properties xmlns:p="http://schemas.microsoft.com/office/2006/metadata/properties" xmlns:xsi="http://www.w3.org/2001/XMLSchema-instance" xmlns:pc="http://schemas.microsoft.com/office/infopath/2007/PartnerControls">
+  <documentManagement>
+    <_ip_UnifiedCompliancePolicyUIAction xmlns="http://schemas.microsoft.com/sharepoint/v3" xsi:nil="true"/>
+    <Image xmlns="71af3243-3dd4-4a8d-8c0d-dd76da1f02a5">
+      <Url xsi:nil="true"/>
+      <Description xsi:nil="true"/>
+    </Image>
+    <Status xmlns="71af3243-3dd4-4a8d-8c0d-dd76da1f02a5">Not started</Status>
+    <_ip_UnifiedCompliancePolicyProperties xmlns="http://schemas.microsoft.com/sharepoint/v3" xsi:nil="true"/>
+    <lcf76f155ced4ddcb4097134ff3c332f xmlns="71af3243-3dd4-4a8d-8c0d-dd76da1f02a5">
+      <Terms xmlns="http://schemas.microsoft.com/office/infopath/2007/PartnerControls"/>
+    </lcf76f155ced4ddcb4097134ff3c332f>
+    <TaxCatchAll xmlns="230e9df3-be65-4c73-a93b-d1236ebd677e"/>
+    <MediaServiceKeyPoints xmlns="71af3243-3dd4-4a8d-8c0d-dd76da1f02a5" xsi:nil="true"/>
+  </documentManagement>
+</p:properties>
+</file>
+
+<file path=customXml/item2.xml><?xml version="1.0" encoding="utf-8"?>
 <ct:contentTypeSchema xmlns:ct="http://schemas.microsoft.com/office/2006/metadata/contentType" xmlns:ma="http://schemas.microsoft.com/office/2006/metadata/properties/metaAttributes" ct:_="" ma:_="" ma:contentTypeName="Document" ma:contentTypeID="0x01010079F111ED35F8CC479449609E8A0923A6" ma:contentTypeVersion="18" ma:contentTypeDescription="Create a new document." ma:contentTypeScope="" ma:versionID="22a266b9fa9a230c5a512669d8b298c3">
   <xsd:schema xmlns:xsd="http://www.w3.org/2001/XMLSchema" xmlns:xs="http://www.w3.org/2001/XMLSchema" xmlns:p="http://schemas.microsoft.com/office/2006/metadata/properties" xmlns:ns1="http://schemas.microsoft.com/sharepoint/v3" xmlns:ns2="71af3243-3dd4-4a8d-8c0d-dd76da1f02a5" xmlns:ns3="16c05727-aa75-4e4a-9b5f-8a80a1165891" xmlns:ns4="230e9df3-be65-4c73-a93b-d1236ebd677e" targetNamespace="http://schemas.microsoft.com/office/2006/metadata/properties" ma:root="true" ma:fieldsID="eddc33fff6b14141ee5c74a0d29ea6a1" ns1:_="" ns2:_="" ns3:_="" ns4:_="">
     <xsd:import namespace="http://schemas.microsoft.com/sharepoint/v3"/>
@@ -26782,25 +26995,6 @@
 </ct:contentTypeSchema>
 </file>
 
-<file path=customXml/item2.xml><?xml version="1.0" encoding="utf-8"?>
-<p:properties xmlns:p="http://schemas.microsoft.com/office/2006/metadata/properties" xmlns:xsi="http://www.w3.org/2001/XMLSchema-instance" xmlns:pc="http://schemas.microsoft.com/office/infopath/2007/PartnerControls">
-  <documentManagement>
-    <_ip_UnifiedCompliancePolicyUIAction xmlns="http://schemas.microsoft.com/sharepoint/v3" xsi:nil="true"/>
-    <Image xmlns="71af3243-3dd4-4a8d-8c0d-dd76da1f02a5">
-      <Url xsi:nil="true"/>
-      <Description xsi:nil="true"/>
-    </Image>
-    <Status xmlns="71af3243-3dd4-4a8d-8c0d-dd76da1f02a5">Not started</Status>
-    <_ip_UnifiedCompliancePolicyProperties xmlns="http://schemas.microsoft.com/sharepoint/v3" xsi:nil="true"/>
-    <lcf76f155ced4ddcb4097134ff3c332f xmlns="71af3243-3dd4-4a8d-8c0d-dd76da1f02a5">
-      <Terms xmlns="http://schemas.microsoft.com/office/infopath/2007/PartnerControls"/>
-    </lcf76f155ced4ddcb4097134ff3c332f>
-    <TaxCatchAll xmlns="230e9df3-be65-4c73-a93b-d1236ebd677e"/>
-    <MediaServiceKeyPoints xmlns="71af3243-3dd4-4a8d-8c0d-dd76da1f02a5" xsi:nil="true"/>
-  </documentManagement>
-</p:properties>
-</file>
-
 <file path=customXml/item3.xml><?xml version="1.0" encoding="utf-8"?>
 <?mso-contentType ?>
 <FormTemplates xmlns="http://schemas.microsoft.com/sharepoint/v3/contenttype/forms">
@@ -26811,6 +27005,18 @@
 </file>
 
 <file path=customXml/itemProps1.xml><?xml version="1.0" encoding="utf-8"?>
+<ds:datastoreItem xmlns:ds="http://schemas.openxmlformats.org/officeDocument/2006/customXml" ds:itemID="{538316A4-DB9D-4B40-83D1-0433996D54B0}">
+  <ds:schemaRefs>
+    <ds:schemaRef ds:uri="http://schemas.microsoft.com/office/2006/metadata/properties"/>
+    <ds:schemaRef ds:uri="http://schemas.microsoft.com/office/infopath/2007/PartnerControls"/>
+    <ds:schemaRef ds:uri="http://schemas.microsoft.com/sharepoint/v3"/>
+    <ds:schemaRef ds:uri="71af3243-3dd4-4a8d-8c0d-dd76da1f02a5"/>
+    <ds:schemaRef ds:uri="230e9df3-be65-4c73-a93b-d1236ebd677e"/>
+  </ds:schemaRefs>
+</ds:datastoreItem>
+</file>
+
+<file path=customXml/itemProps2.xml><?xml version="1.0" encoding="utf-8"?>
 <ds:datastoreItem xmlns:ds="http://schemas.openxmlformats.org/officeDocument/2006/customXml" ds:itemID="{1E5C9C91-7BEA-497B-8B74-808BB0864508}">
   <ds:schemaRefs>
     <ds:schemaRef ds:uri="http://schemas.microsoft.com/office/2006/metadata/contentType"/>
@@ -26831,18 +27037,6 @@
 </ds:datastoreItem>
 </file>
 
-<file path=customXml/itemProps2.xml><?xml version="1.0" encoding="utf-8"?>
-<ds:datastoreItem xmlns:ds="http://schemas.openxmlformats.org/officeDocument/2006/customXml" ds:itemID="{538316A4-DB9D-4B40-83D1-0433996D54B0}">
-  <ds:schemaRefs>
-    <ds:schemaRef ds:uri="http://schemas.microsoft.com/office/2006/metadata/properties"/>
-    <ds:schemaRef ds:uri="http://schemas.microsoft.com/office/infopath/2007/PartnerControls"/>
-    <ds:schemaRef ds:uri="http://schemas.microsoft.com/sharepoint/v3"/>
-    <ds:schemaRef ds:uri="71af3243-3dd4-4a8d-8c0d-dd76da1f02a5"/>
-    <ds:schemaRef ds:uri="230e9df3-be65-4c73-a93b-d1236ebd677e"/>
-  </ds:schemaRefs>
-</ds:datastoreItem>
-</file>
-
 <file path=customXml/itemProps3.xml><?xml version="1.0" encoding="utf-8"?>
 <ds:datastoreItem xmlns:ds="http://schemas.openxmlformats.org/officeDocument/2006/customXml" ds:itemID="{F49FD94B-CF2B-4485-954E-6805E96E51FA}">
   <ds:schemaRefs>

</xml_diff>